<commit_message>
refreshed to replace Ecoverse with Hub; organiZation
</commit_message>
<xml_diff>
--- a/docs/diagrams/technical-design-diagrams.pptx
+++ b/docs/diagrams/technical-design-diagrams.pptx
@@ -11,7 +11,7 @@
     <p:sldId id="288" r:id="rId5"/>
     <p:sldId id="289" r:id="rId6"/>
     <p:sldId id="290" r:id="rId7"/>
-    <p:sldId id="303" r:id="rId8"/>
+    <p:sldId id="306" r:id="rId8"/>
     <p:sldId id="291" r:id="rId9"/>
     <p:sldId id="300" r:id="rId10"/>
     <p:sldId id="302" r:id="rId11"/>
@@ -1197,7 +1197,7 @@
           <a:p>
             <a:fld id="{298D3A90-CAB1-42FB-8A0E-3A1E243F5F7E}" type="datetimeFigureOut">
               <a:rPr lang="en-GB" smtClean="0"/>
-              <a:t>29/07/2021</a:t>
+              <a:t>16/10/2021</a:t>
             </a:fld>
             <a:endParaRPr lang="en-GB"/>
           </a:p>
@@ -3041,7 +3041,7 @@
           <a:p>
             <a:fld id="{916F03E0-BF6A-4598-B16A-7714AE2A9F25}" type="datetimeFigureOut">
               <a:rPr lang="en-GB" smtClean="0"/>
-              <a:t>29/07/2021</a:t>
+              <a:t>16/10/2021</a:t>
             </a:fld>
             <a:endParaRPr lang="en-GB"/>
           </a:p>
@@ -3241,7 +3241,7 @@
           <a:p>
             <a:fld id="{916F03E0-BF6A-4598-B16A-7714AE2A9F25}" type="datetimeFigureOut">
               <a:rPr lang="en-GB" smtClean="0"/>
-              <a:t>29/07/2021</a:t>
+              <a:t>16/10/2021</a:t>
             </a:fld>
             <a:endParaRPr lang="en-GB"/>
           </a:p>
@@ -3451,7 +3451,7 @@
           <a:p>
             <a:fld id="{916F03E0-BF6A-4598-B16A-7714AE2A9F25}" type="datetimeFigureOut">
               <a:rPr lang="en-GB" smtClean="0"/>
-              <a:t>29/07/2021</a:t>
+              <a:t>16/10/2021</a:t>
             </a:fld>
             <a:endParaRPr lang="en-GB"/>
           </a:p>
@@ -3852,7 +3852,7 @@
           <a:p>
             <a:fld id="{916F03E0-BF6A-4598-B16A-7714AE2A9F25}" type="datetimeFigureOut">
               <a:rPr lang="en-GB" smtClean="0"/>
-              <a:t>29/07/2021</a:t>
+              <a:t>16/10/2021</a:t>
             </a:fld>
             <a:endParaRPr lang="en-GB"/>
           </a:p>
@@ -4128,7 +4128,7 @@
           <a:p>
             <a:fld id="{916F03E0-BF6A-4598-B16A-7714AE2A9F25}" type="datetimeFigureOut">
               <a:rPr lang="en-GB" smtClean="0"/>
-              <a:t>29/07/2021</a:t>
+              <a:t>16/10/2021</a:t>
             </a:fld>
             <a:endParaRPr lang="en-GB"/>
           </a:p>
@@ -4396,7 +4396,7 @@
           <a:p>
             <a:fld id="{916F03E0-BF6A-4598-B16A-7714AE2A9F25}" type="datetimeFigureOut">
               <a:rPr lang="en-GB" smtClean="0"/>
-              <a:t>29/07/2021</a:t>
+              <a:t>16/10/2021</a:t>
             </a:fld>
             <a:endParaRPr lang="en-GB"/>
           </a:p>
@@ -4811,7 +4811,7 @@
           <a:p>
             <a:fld id="{916F03E0-BF6A-4598-B16A-7714AE2A9F25}" type="datetimeFigureOut">
               <a:rPr lang="en-GB" smtClean="0"/>
-              <a:t>29/07/2021</a:t>
+              <a:t>16/10/2021</a:t>
             </a:fld>
             <a:endParaRPr lang="en-GB"/>
           </a:p>
@@ -4953,7 +4953,7 @@
           <a:p>
             <a:fld id="{916F03E0-BF6A-4598-B16A-7714AE2A9F25}" type="datetimeFigureOut">
               <a:rPr lang="en-GB" smtClean="0"/>
-              <a:t>29/07/2021</a:t>
+              <a:t>16/10/2021</a:t>
             </a:fld>
             <a:endParaRPr lang="en-GB"/>
           </a:p>
@@ -5066,7 +5066,7 @@
           <a:p>
             <a:fld id="{916F03E0-BF6A-4598-B16A-7714AE2A9F25}" type="datetimeFigureOut">
               <a:rPr lang="en-GB" smtClean="0"/>
-              <a:t>29/07/2021</a:t>
+              <a:t>16/10/2021</a:t>
             </a:fld>
             <a:endParaRPr lang="en-GB"/>
           </a:p>
@@ -5379,7 +5379,7 @@
           <a:p>
             <a:fld id="{916F03E0-BF6A-4598-B16A-7714AE2A9F25}" type="datetimeFigureOut">
               <a:rPr lang="en-GB" smtClean="0"/>
-              <a:t>29/07/2021</a:t>
+              <a:t>16/10/2021</a:t>
             </a:fld>
             <a:endParaRPr lang="en-GB"/>
           </a:p>
@@ -5668,7 +5668,7 @@
           <a:p>
             <a:fld id="{916F03E0-BF6A-4598-B16A-7714AE2A9F25}" type="datetimeFigureOut">
               <a:rPr lang="en-GB" smtClean="0"/>
-              <a:t>29/07/2021</a:t>
+              <a:t>16/10/2021</a:t>
             </a:fld>
             <a:endParaRPr lang="en-GB"/>
           </a:p>
@@ -6032,7 +6032,7 @@
           <a:p>
             <a:fld id="{916F03E0-BF6A-4598-B16A-7714AE2A9F25}" type="datetimeFigureOut">
               <a:rPr lang="en-GB" smtClean="0"/>
-              <a:t>29/07/2021</a:t>
+              <a:t>16/10/2021</a:t>
             </a:fld>
             <a:endParaRPr lang="en-GB"/>
           </a:p>
@@ -8227,7 +8227,7 @@
           <a:p>
             <a:pPr marL="152396"/>
             <a:r>
-              <a:rPr lang="nl" sz="2667" b="1" dirty="0">
+              <a:rPr lang="nl" sz="2667" b="1">
                 <a:solidFill>
                   <a:srgbClr val="FFFFFF"/>
                 </a:solidFill>
@@ -8238,7 +8238,7 @@
               </a:rPr>
               <a:t>NETWORK EFFECT: SHARED COMMUNITY</a:t>
             </a:r>
-            <a:endParaRPr sz="2667" b="1" dirty="0">
+            <a:endParaRPr sz="2667" b="1">
               <a:solidFill>
                 <a:srgbClr val="FFFFFF"/>
               </a:solidFill>
@@ -8250,902 +8250,6 @@
           </a:p>
         </p:txBody>
       </p:sp>
-      <p:grpSp>
-        <p:nvGrpSpPr>
-          <p:cNvPr id="22" name="Group 21">
-            <a:extLst>
-              <a:ext uri="{FF2B5EF4-FFF2-40B4-BE49-F238E27FC236}">
-                <a16:creationId xmlns:a16="http://schemas.microsoft.com/office/drawing/2014/main" id="{4E6E78AA-60D5-46B4-85F1-097121EAD6FB}"/>
-              </a:ext>
-            </a:extLst>
-          </p:cNvPr>
-          <p:cNvGrpSpPr/>
-          <p:nvPr/>
-        </p:nvGrpSpPr>
-        <p:grpSpPr>
-          <a:xfrm>
-            <a:off x="5307353" y="2656716"/>
-            <a:ext cx="6365936" cy="2521724"/>
-            <a:chOff x="5199961" y="3214457"/>
-            <a:chExt cx="6365936" cy="2521724"/>
-          </a:xfrm>
-        </p:grpSpPr>
-        <p:sp>
-          <p:nvSpPr>
-            <p:cNvPr id="23" name="Google Shape;301;p25">
-              <a:extLst>
-                <a:ext uri="{FF2B5EF4-FFF2-40B4-BE49-F238E27FC236}">
-                  <a16:creationId xmlns:a16="http://schemas.microsoft.com/office/drawing/2014/main" id="{1114D5A7-7286-4C8E-B146-E3B79BF4A6A8}"/>
-                </a:ext>
-              </a:extLst>
-            </p:cNvPr>
-            <p:cNvSpPr/>
-            <p:nvPr/>
-          </p:nvSpPr>
-          <p:spPr>
-            <a:xfrm>
-              <a:off x="5199961" y="3418241"/>
-              <a:ext cx="6365936" cy="2317940"/>
-            </a:xfrm>
-            <a:prstGeom prst="roundRect">
-              <a:avLst>
-                <a:gd name="adj" fmla="val 16667"/>
-              </a:avLst>
-            </a:prstGeom>
-            <a:solidFill>
-              <a:schemeClr val="lt2"/>
-            </a:solidFill>
-            <a:ln w="9525" cap="flat" cmpd="sng">
-              <a:solidFill>
-                <a:schemeClr val="dk2"/>
-              </a:solidFill>
-              <a:prstDash val="solid"/>
-              <a:round/>
-              <a:headEnd type="none" w="sm" len="sm"/>
-              <a:tailEnd type="none" w="sm" len="sm"/>
-            </a:ln>
-          </p:spPr>
-          <p:txBody>
-            <a:bodyPr spcFirstLastPara="1" wrap="square" lIns="121900" tIns="121900" rIns="121900" bIns="121900" anchor="ctr" anchorCtr="0">
-              <a:noAutofit/>
-            </a:bodyPr>
-            <a:lstStyle/>
-            <a:p>
-              <a:endParaRPr sz="2400"/>
-            </a:p>
-          </p:txBody>
-        </p:sp>
-        <p:cxnSp>
-          <p:nvCxnSpPr>
-            <p:cNvPr id="24" name="Google Shape;302;p25">
-              <a:extLst>
-                <a:ext uri="{FF2B5EF4-FFF2-40B4-BE49-F238E27FC236}">
-                  <a16:creationId xmlns:a16="http://schemas.microsoft.com/office/drawing/2014/main" id="{52CEA8E2-F52F-4ECF-AE82-4C9B6776B72B}"/>
-                </a:ext>
-              </a:extLst>
-            </p:cNvPr>
-            <p:cNvCxnSpPr>
-              <a:cxnSpLocks/>
-            </p:cNvCxnSpPr>
-            <p:nvPr/>
-          </p:nvCxnSpPr>
-          <p:spPr>
-            <a:xfrm>
-              <a:off x="8557898" y="4401348"/>
-              <a:ext cx="1313066" cy="0"/>
-            </a:xfrm>
-            <a:prstGeom prst="straightConnector1">
-              <a:avLst/>
-            </a:prstGeom>
-            <a:noFill/>
-            <a:ln w="76200" cap="flat" cmpd="sng">
-              <a:solidFill>
-                <a:srgbClr val="00BCD4"/>
-              </a:solidFill>
-              <a:prstDash val="dot"/>
-              <a:round/>
-              <a:headEnd type="none" w="med" len="med"/>
-              <a:tailEnd type="none" w="med" len="med"/>
-            </a:ln>
-          </p:spPr>
-        </p:cxnSp>
-        <p:sp>
-          <p:nvSpPr>
-            <p:cNvPr id="25" name="Google Shape;303;p25">
-              <a:extLst>
-                <a:ext uri="{FF2B5EF4-FFF2-40B4-BE49-F238E27FC236}">
-                  <a16:creationId xmlns:a16="http://schemas.microsoft.com/office/drawing/2014/main" id="{049F7526-826F-4129-A543-B85E183A74D0}"/>
-                </a:ext>
-              </a:extLst>
-            </p:cNvPr>
-            <p:cNvSpPr txBox="1"/>
-            <p:nvPr/>
-          </p:nvSpPr>
-          <p:spPr>
-            <a:xfrm>
-              <a:off x="5908433" y="3214457"/>
-              <a:ext cx="5204504" cy="615513"/>
-            </a:xfrm>
-            <a:prstGeom prst="rect">
-              <a:avLst/>
-            </a:prstGeom>
-            <a:noFill/>
-            <a:ln>
-              <a:noFill/>
-            </a:ln>
-          </p:spPr>
-          <p:txBody>
-            <a:bodyPr spcFirstLastPara="1" wrap="square" lIns="121900" tIns="121900" rIns="121900" bIns="121900" anchor="t" anchorCtr="0">
-              <a:spAutoFit/>
-            </a:bodyPr>
-            <a:lstStyle/>
-            <a:p>
-              <a:pPr algn="ctr"/>
-              <a:endParaRPr lang="nl" sz="2400">
-                <a:latin typeface="Alegreya"/>
-              </a:endParaRPr>
-            </a:p>
-          </p:txBody>
-        </p:sp>
-        <p:sp>
-          <p:nvSpPr>
-            <p:cNvPr id="26" name="Google Shape;304;p25">
-              <a:extLst>
-                <a:ext uri="{FF2B5EF4-FFF2-40B4-BE49-F238E27FC236}">
-                  <a16:creationId xmlns:a16="http://schemas.microsoft.com/office/drawing/2014/main" id="{03C365CD-E4EB-4774-B85F-6F4E106A0AB9}"/>
-                </a:ext>
-              </a:extLst>
-            </p:cNvPr>
-            <p:cNvSpPr/>
-            <p:nvPr/>
-          </p:nvSpPr>
-          <p:spPr>
-            <a:xfrm>
-              <a:off x="5510768" y="5168248"/>
-              <a:ext cx="5845562" cy="370800"/>
-            </a:xfrm>
-            <a:prstGeom prst="roundRect">
-              <a:avLst>
-                <a:gd name="adj" fmla="val 16667"/>
-              </a:avLst>
-            </a:prstGeom>
-            <a:solidFill>
-              <a:srgbClr val="00BCD4">
-                <a:alpha val="28430"/>
-              </a:srgbClr>
-            </a:solidFill>
-            <a:ln w="9525" cap="flat" cmpd="sng">
-              <a:solidFill>
-                <a:schemeClr val="dk2"/>
-              </a:solidFill>
-              <a:prstDash val="solid"/>
-              <a:round/>
-              <a:headEnd type="none" w="sm" len="sm"/>
-              <a:tailEnd type="none" w="sm" len="sm"/>
-            </a:ln>
-          </p:spPr>
-          <p:txBody>
-            <a:bodyPr spcFirstLastPara="1" wrap="square" lIns="121900" tIns="121900" rIns="121900" bIns="121900" anchor="ctr" anchorCtr="0">
-              <a:noAutofit/>
-            </a:bodyPr>
-            <a:lstStyle/>
-            <a:p>
-              <a:pPr algn="ctr"/>
-              <a:r>
-                <a:rPr lang="nl" sz="2400" b="1">
-                  <a:latin typeface="Alegreya"/>
-                </a:rPr>
-                <a:t>Community</a:t>
-              </a:r>
-              <a:endParaRPr sz="1600" b="1">
-                <a:latin typeface="Alegreya"/>
-              </a:endParaRPr>
-            </a:p>
-          </p:txBody>
-        </p:sp>
-        <p:grpSp>
-          <p:nvGrpSpPr>
-            <p:cNvPr id="27" name="Google Shape;305;p25">
-              <a:extLst>
-                <a:ext uri="{FF2B5EF4-FFF2-40B4-BE49-F238E27FC236}">
-                  <a16:creationId xmlns:a16="http://schemas.microsoft.com/office/drawing/2014/main" id="{AE63C97F-0366-4C69-BED2-726C63457962}"/>
-                </a:ext>
-              </a:extLst>
-            </p:cNvPr>
-            <p:cNvGrpSpPr/>
-            <p:nvPr/>
-          </p:nvGrpSpPr>
-          <p:grpSpPr>
-            <a:xfrm>
-              <a:off x="5510768" y="3877218"/>
-              <a:ext cx="1217939" cy="1048259"/>
-              <a:chOff x="785118" y="1200194"/>
-              <a:chExt cx="2615100" cy="2817900"/>
-            </a:xfrm>
-          </p:grpSpPr>
-          <p:sp>
-            <p:nvSpPr>
-              <p:cNvPr id="49" name="Google Shape;306;p25">
-                <a:extLst>
-                  <a:ext uri="{FF2B5EF4-FFF2-40B4-BE49-F238E27FC236}">
-                    <a16:creationId xmlns:a16="http://schemas.microsoft.com/office/drawing/2014/main" id="{6FAF7101-4D9D-4C55-AB5C-65111B2758DB}"/>
-                  </a:ext>
-                </a:extLst>
-              </p:cNvPr>
-              <p:cNvSpPr/>
-              <p:nvPr/>
-            </p:nvSpPr>
-            <p:spPr>
-              <a:xfrm>
-                <a:off x="785118" y="1200194"/>
-                <a:ext cx="2615100" cy="2817900"/>
-              </a:xfrm>
-              <a:prstGeom prst="roundRect">
-                <a:avLst>
-                  <a:gd name="adj" fmla="val 16667"/>
-                </a:avLst>
-              </a:prstGeom>
-              <a:solidFill>
-                <a:srgbClr val="CCCCCC"/>
-              </a:solidFill>
-              <a:ln w="28575" cap="flat" cmpd="sng">
-                <a:solidFill>
-                  <a:schemeClr val="dk2"/>
-                </a:solidFill>
-                <a:prstDash val="solid"/>
-                <a:round/>
-                <a:headEnd type="none" w="sm" len="sm"/>
-                <a:tailEnd type="none" w="sm" len="sm"/>
-              </a:ln>
-            </p:spPr>
-            <p:txBody>
-              <a:bodyPr spcFirstLastPara="1" wrap="square" lIns="121900" tIns="121900" rIns="121900" bIns="121900" anchor="ctr" anchorCtr="0">
-                <a:noAutofit/>
-              </a:bodyPr>
-              <a:lstStyle/>
-              <a:p>
-                <a:endParaRPr sz="2400"/>
-              </a:p>
-            </p:txBody>
-          </p:sp>
-          <p:pic>
-            <p:nvPicPr>
-              <p:cNvPr id="50" name="Google Shape;307;p25">
-                <a:extLst>
-                  <a:ext uri="{FF2B5EF4-FFF2-40B4-BE49-F238E27FC236}">
-                    <a16:creationId xmlns:a16="http://schemas.microsoft.com/office/drawing/2014/main" id="{FF18FF2C-5BB2-4628-BDB5-97CF985C2CBF}"/>
-                  </a:ext>
-                </a:extLst>
-              </p:cNvPr>
-              <p:cNvPicPr preferRelativeResize="0"/>
-              <p:nvPr/>
-            </p:nvPicPr>
-            <p:blipFill>
-              <a:blip r:embed="rId3">
-                <a:alphaModFix/>
-              </a:blip>
-              <a:stretch>
-                <a:fillRect/>
-              </a:stretch>
-            </p:blipFill>
-            <p:spPr>
-              <a:xfrm>
-                <a:off x="1329851" y="1579725"/>
-                <a:ext cx="1051099" cy="697200"/>
-              </a:xfrm>
-              <a:prstGeom prst="rect">
-                <a:avLst/>
-              </a:prstGeom>
-              <a:noFill/>
-              <a:ln w="9525" cap="flat" cmpd="sng">
-                <a:solidFill>
-                  <a:schemeClr val="dk2"/>
-                </a:solidFill>
-                <a:prstDash val="solid"/>
-                <a:round/>
-                <a:headEnd type="none" w="sm" len="sm"/>
-                <a:tailEnd type="none" w="sm" len="sm"/>
-              </a:ln>
-            </p:spPr>
-          </p:pic>
-          <p:pic>
-            <p:nvPicPr>
-              <p:cNvPr id="51" name="Google Shape;308;p25">
-                <a:extLst>
-                  <a:ext uri="{FF2B5EF4-FFF2-40B4-BE49-F238E27FC236}">
-                    <a16:creationId xmlns:a16="http://schemas.microsoft.com/office/drawing/2014/main" id="{4DBD3EF3-9676-41C0-B930-E4A8CDAA611A}"/>
-                  </a:ext>
-                </a:extLst>
-              </p:cNvPr>
-              <p:cNvPicPr preferRelativeResize="0"/>
-              <p:nvPr/>
-            </p:nvPicPr>
-            <p:blipFill>
-              <a:blip r:embed="rId3">
-                <a:alphaModFix/>
-              </a:blip>
-              <a:stretch>
-                <a:fillRect/>
-              </a:stretch>
-            </p:blipFill>
-            <p:spPr>
-              <a:xfrm>
-                <a:off x="1604825" y="1799950"/>
-                <a:ext cx="1102000" cy="730950"/>
-              </a:xfrm>
-              <a:prstGeom prst="rect">
-                <a:avLst/>
-              </a:prstGeom>
-              <a:noFill/>
-              <a:ln w="9525" cap="flat" cmpd="sng">
-                <a:solidFill>
-                  <a:schemeClr val="dk2"/>
-                </a:solidFill>
-                <a:prstDash val="solid"/>
-                <a:round/>
-                <a:headEnd type="none" w="sm" len="sm"/>
-                <a:tailEnd type="none" w="sm" len="sm"/>
-              </a:ln>
-            </p:spPr>
-          </p:pic>
-          <p:pic>
-            <p:nvPicPr>
-              <p:cNvPr id="52" name="Google Shape;309;p25">
-                <a:extLst>
-                  <a:ext uri="{FF2B5EF4-FFF2-40B4-BE49-F238E27FC236}">
-                    <a16:creationId xmlns:a16="http://schemas.microsoft.com/office/drawing/2014/main" id="{6B3D20AF-88A3-411A-B8E3-93471556BB78}"/>
-                  </a:ext>
-                </a:extLst>
-              </p:cNvPr>
-              <p:cNvPicPr preferRelativeResize="0"/>
-              <p:nvPr/>
-            </p:nvPicPr>
-            <p:blipFill>
-              <a:blip r:embed="rId3">
-                <a:alphaModFix/>
-              </a:blip>
-              <a:stretch>
-                <a:fillRect/>
-              </a:stretch>
-            </p:blipFill>
-            <p:spPr>
-              <a:xfrm>
-                <a:off x="1872975" y="2025094"/>
-                <a:ext cx="1102000" cy="730956"/>
-              </a:xfrm>
-              <a:prstGeom prst="rect">
-                <a:avLst/>
-              </a:prstGeom>
-              <a:noFill/>
-              <a:ln w="9525" cap="flat" cmpd="sng">
-                <a:solidFill>
-                  <a:schemeClr val="dk2"/>
-                </a:solidFill>
-                <a:prstDash val="solid"/>
-                <a:round/>
-                <a:headEnd type="none" w="sm" len="sm"/>
-                <a:tailEnd type="none" w="sm" len="sm"/>
-              </a:ln>
-            </p:spPr>
-          </p:pic>
-          <p:sp>
-            <p:nvSpPr>
-              <p:cNvPr id="53" name="Google Shape;310;p25">
-                <a:extLst>
-                  <a:ext uri="{FF2B5EF4-FFF2-40B4-BE49-F238E27FC236}">
-                    <a16:creationId xmlns:a16="http://schemas.microsoft.com/office/drawing/2014/main" id="{32B2E681-F8D9-4E8B-B8E1-CDF024CFD296}"/>
-                  </a:ext>
-                </a:extLst>
-              </p:cNvPr>
-              <p:cNvSpPr txBox="1"/>
-              <p:nvPr/>
-            </p:nvSpPr>
-            <p:spPr>
-              <a:xfrm>
-                <a:off x="1007393" y="2859598"/>
-                <a:ext cx="2170500" cy="1158191"/>
-              </a:xfrm>
-              <a:prstGeom prst="rect">
-                <a:avLst/>
-              </a:prstGeom>
-              <a:noFill/>
-              <a:ln>
-                <a:noFill/>
-              </a:ln>
-            </p:spPr>
-            <p:txBody>
-              <a:bodyPr spcFirstLastPara="1" wrap="square" lIns="121900" tIns="121900" rIns="121900" bIns="121900" anchor="t" anchorCtr="0">
-                <a:spAutoFit/>
-              </a:bodyPr>
-              <a:lstStyle/>
-              <a:p>
-                <a:pPr algn="ctr"/>
-                <a:r>
-                  <a:rPr lang="nl" sz="1200" err="1">
-                    <a:solidFill>
-                      <a:srgbClr val="666666"/>
-                    </a:solidFill>
-                  </a:rPr>
-                  <a:t>Ecoverse</a:t>
-                </a:r>
-                <a:endParaRPr sz="1200" err="1">
-                  <a:solidFill>
-                    <a:srgbClr val="666666"/>
-                  </a:solidFill>
-                </a:endParaRPr>
-              </a:p>
-            </p:txBody>
-          </p:sp>
-        </p:grpSp>
-        <p:grpSp>
-          <p:nvGrpSpPr>
-            <p:cNvPr id="28" name="Google Shape;311;p25">
-              <a:extLst>
-                <a:ext uri="{FF2B5EF4-FFF2-40B4-BE49-F238E27FC236}">
-                  <a16:creationId xmlns:a16="http://schemas.microsoft.com/office/drawing/2014/main" id="{D6D863A2-49D9-478B-9177-E272AE418C80}"/>
-                </a:ext>
-              </a:extLst>
-            </p:cNvPr>
-            <p:cNvGrpSpPr/>
-            <p:nvPr/>
-          </p:nvGrpSpPr>
-          <p:grpSpPr>
-            <a:xfrm>
-              <a:off x="7045543" y="3877218"/>
-              <a:ext cx="1217939" cy="1048259"/>
-              <a:chOff x="785118" y="1200194"/>
-              <a:chExt cx="2615100" cy="2817900"/>
-            </a:xfrm>
-          </p:grpSpPr>
-          <p:sp>
-            <p:nvSpPr>
-              <p:cNvPr id="44" name="Google Shape;312;p25">
-                <a:extLst>
-                  <a:ext uri="{FF2B5EF4-FFF2-40B4-BE49-F238E27FC236}">
-                    <a16:creationId xmlns:a16="http://schemas.microsoft.com/office/drawing/2014/main" id="{77C9B694-00E5-4B03-9D77-DA0D613BF5BE}"/>
-                  </a:ext>
-                </a:extLst>
-              </p:cNvPr>
-              <p:cNvSpPr/>
-              <p:nvPr/>
-            </p:nvSpPr>
-            <p:spPr>
-              <a:xfrm>
-                <a:off x="785118" y="1200194"/>
-                <a:ext cx="2615100" cy="2817900"/>
-              </a:xfrm>
-              <a:prstGeom prst="roundRect">
-                <a:avLst>
-                  <a:gd name="adj" fmla="val 16667"/>
-                </a:avLst>
-              </a:prstGeom>
-              <a:solidFill>
-                <a:srgbClr val="CCCCCC"/>
-              </a:solidFill>
-              <a:ln w="28575" cap="flat" cmpd="sng">
-                <a:solidFill>
-                  <a:schemeClr val="dk2"/>
-                </a:solidFill>
-                <a:prstDash val="solid"/>
-                <a:round/>
-                <a:headEnd type="none" w="sm" len="sm"/>
-                <a:tailEnd type="none" w="sm" len="sm"/>
-              </a:ln>
-            </p:spPr>
-            <p:txBody>
-              <a:bodyPr spcFirstLastPara="1" wrap="square" lIns="121900" tIns="121900" rIns="121900" bIns="121900" anchor="ctr" anchorCtr="0">
-                <a:noAutofit/>
-              </a:bodyPr>
-              <a:lstStyle/>
-              <a:p>
-                <a:endParaRPr sz="2400"/>
-              </a:p>
-            </p:txBody>
-          </p:sp>
-          <p:pic>
-            <p:nvPicPr>
-              <p:cNvPr id="45" name="Google Shape;313;p25">
-                <a:extLst>
-                  <a:ext uri="{FF2B5EF4-FFF2-40B4-BE49-F238E27FC236}">
-                    <a16:creationId xmlns:a16="http://schemas.microsoft.com/office/drawing/2014/main" id="{CF33149A-FA48-41BA-8FE2-227B34738AFD}"/>
-                  </a:ext>
-                </a:extLst>
-              </p:cNvPr>
-              <p:cNvPicPr preferRelativeResize="0"/>
-              <p:nvPr/>
-            </p:nvPicPr>
-            <p:blipFill>
-              <a:blip r:embed="rId3">
-                <a:alphaModFix/>
-              </a:blip>
-              <a:stretch>
-                <a:fillRect/>
-              </a:stretch>
-            </p:blipFill>
-            <p:spPr>
-              <a:xfrm>
-                <a:off x="1329851" y="1579725"/>
-                <a:ext cx="1051099" cy="697200"/>
-              </a:xfrm>
-              <a:prstGeom prst="rect">
-                <a:avLst/>
-              </a:prstGeom>
-              <a:noFill/>
-              <a:ln w="9525" cap="flat" cmpd="sng">
-                <a:solidFill>
-                  <a:schemeClr val="dk2"/>
-                </a:solidFill>
-                <a:prstDash val="solid"/>
-                <a:round/>
-                <a:headEnd type="none" w="sm" len="sm"/>
-                <a:tailEnd type="none" w="sm" len="sm"/>
-              </a:ln>
-            </p:spPr>
-          </p:pic>
-          <p:pic>
-            <p:nvPicPr>
-              <p:cNvPr id="46" name="Google Shape;314;p25">
-                <a:extLst>
-                  <a:ext uri="{FF2B5EF4-FFF2-40B4-BE49-F238E27FC236}">
-                    <a16:creationId xmlns:a16="http://schemas.microsoft.com/office/drawing/2014/main" id="{91123DE7-08D8-4858-BE02-35B20F065AB6}"/>
-                  </a:ext>
-                </a:extLst>
-              </p:cNvPr>
-              <p:cNvPicPr preferRelativeResize="0"/>
-              <p:nvPr/>
-            </p:nvPicPr>
-            <p:blipFill>
-              <a:blip r:embed="rId3">
-                <a:alphaModFix/>
-              </a:blip>
-              <a:stretch>
-                <a:fillRect/>
-              </a:stretch>
-            </p:blipFill>
-            <p:spPr>
-              <a:xfrm>
-                <a:off x="1604825" y="1799950"/>
-                <a:ext cx="1102000" cy="730950"/>
-              </a:xfrm>
-              <a:prstGeom prst="rect">
-                <a:avLst/>
-              </a:prstGeom>
-              <a:noFill/>
-              <a:ln w="9525" cap="flat" cmpd="sng">
-                <a:solidFill>
-                  <a:schemeClr val="dk2"/>
-                </a:solidFill>
-                <a:prstDash val="solid"/>
-                <a:round/>
-                <a:headEnd type="none" w="sm" len="sm"/>
-                <a:tailEnd type="none" w="sm" len="sm"/>
-              </a:ln>
-            </p:spPr>
-          </p:pic>
-          <p:pic>
-            <p:nvPicPr>
-              <p:cNvPr id="47" name="Google Shape;315;p25">
-                <a:extLst>
-                  <a:ext uri="{FF2B5EF4-FFF2-40B4-BE49-F238E27FC236}">
-                    <a16:creationId xmlns:a16="http://schemas.microsoft.com/office/drawing/2014/main" id="{33D9FFEE-2D88-4413-A5B6-0C8D2C25F875}"/>
-                  </a:ext>
-                </a:extLst>
-              </p:cNvPr>
-              <p:cNvPicPr preferRelativeResize="0"/>
-              <p:nvPr/>
-            </p:nvPicPr>
-            <p:blipFill>
-              <a:blip r:embed="rId3">
-                <a:alphaModFix/>
-              </a:blip>
-              <a:stretch>
-                <a:fillRect/>
-              </a:stretch>
-            </p:blipFill>
-            <p:spPr>
-              <a:xfrm>
-                <a:off x="1872975" y="2025094"/>
-                <a:ext cx="1102000" cy="730956"/>
-              </a:xfrm>
-              <a:prstGeom prst="rect">
-                <a:avLst/>
-              </a:prstGeom>
-              <a:noFill/>
-              <a:ln w="9525" cap="flat" cmpd="sng">
-                <a:solidFill>
-                  <a:schemeClr val="dk2"/>
-                </a:solidFill>
-                <a:prstDash val="solid"/>
-                <a:round/>
-                <a:headEnd type="none" w="sm" len="sm"/>
-                <a:tailEnd type="none" w="sm" len="sm"/>
-              </a:ln>
-            </p:spPr>
-          </p:pic>
-          <p:sp>
-            <p:nvSpPr>
-              <p:cNvPr id="48" name="Google Shape;316;p25">
-                <a:extLst>
-                  <a:ext uri="{FF2B5EF4-FFF2-40B4-BE49-F238E27FC236}">
-                    <a16:creationId xmlns:a16="http://schemas.microsoft.com/office/drawing/2014/main" id="{444018B0-8DD8-4874-99AF-A40C66DDDF74}"/>
-                  </a:ext>
-                </a:extLst>
-              </p:cNvPr>
-              <p:cNvSpPr txBox="1"/>
-              <p:nvPr/>
-            </p:nvSpPr>
-            <p:spPr>
-              <a:xfrm>
-                <a:off x="1007393" y="2859598"/>
-                <a:ext cx="2170500" cy="1158191"/>
-              </a:xfrm>
-              <a:prstGeom prst="rect">
-                <a:avLst/>
-              </a:prstGeom>
-              <a:noFill/>
-              <a:ln>
-                <a:noFill/>
-              </a:ln>
-            </p:spPr>
-            <p:txBody>
-              <a:bodyPr spcFirstLastPara="1" wrap="square" lIns="121900" tIns="121900" rIns="121900" bIns="121900" anchor="t" anchorCtr="0">
-                <a:spAutoFit/>
-              </a:bodyPr>
-              <a:lstStyle/>
-              <a:p>
-                <a:pPr algn="ctr"/>
-                <a:r>
-                  <a:rPr lang="nl" sz="1200" err="1">
-                    <a:solidFill>
-                      <a:srgbClr val="666666"/>
-                    </a:solidFill>
-                  </a:rPr>
-                  <a:t>Ecoverse</a:t>
-                </a:r>
-                <a:endParaRPr sz="1200" err="1">
-                  <a:solidFill>
-                    <a:srgbClr val="666666"/>
-                  </a:solidFill>
-                </a:endParaRPr>
-              </a:p>
-            </p:txBody>
-          </p:sp>
-        </p:grpSp>
-        <p:grpSp>
-          <p:nvGrpSpPr>
-            <p:cNvPr id="38" name="Google Shape;317;p25">
-              <a:extLst>
-                <a:ext uri="{FF2B5EF4-FFF2-40B4-BE49-F238E27FC236}">
-                  <a16:creationId xmlns:a16="http://schemas.microsoft.com/office/drawing/2014/main" id="{96A90362-3347-489D-9A7A-582CCF3919F1}"/>
-                </a:ext>
-              </a:extLst>
-            </p:cNvPr>
-            <p:cNvGrpSpPr/>
-            <p:nvPr/>
-          </p:nvGrpSpPr>
-          <p:grpSpPr>
-            <a:xfrm>
-              <a:off x="10063930" y="3909716"/>
-              <a:ext cx="1217939" cy="1048259"/>
-              <a:chOff x="785118" y="1200194"/>
-              <a:chExt cx="2615100" cy="2817900"/>
-            </a:xfrm>
-          </p:grpSpPr>
-          <p:sp>
-            <p:nvSpPr>
-              <p:cNvPr id="39" name="Google Shape;318;p25">
-                <a:extLst>
-                  <a:ext uri="{FF2B5EF4-FFF2-40B4-BE49-F238E27FC236}">
-                    <a16:creationId xmlns:a16="http://schemas.microsoft.com/office/drawing/2014/main" id="{CEF47969-DF84-4B26-842B-BF4BA6F0A969}"/>
-                  </a:ext>
-                </a:extLst>
-              </p:cNvPr>
-              <p:cNvSpPr/>
-              <p:nvPr/>
-            </p:nvSpPr>
-            <p:spPr>
-              <a:xfrm>
-                <a:off x="785118" y="1200194"/>
-                <a:ext cx="2615100" cy="2817900"/>
-              </a:xfrm>
-              <a:prstGeom prst="roundRect">
-                <a:avLst>
-                  <a:gd name="adj" fmla="val 16667"/>
-                </a:avLst>
-              </a:prstGeom>
-              <a:solidFill>
-                <a:srgbClr val="CCCCCC"/>
-              </a:solidFill>
-              <a:ln w="28575" cap="flat" cmpd="sng">
-                <a:solidFill>
-                  <a:schemeClr val="dk2"/>
-                </a:solidFill>
-                <a:prstDash val="solid"/>
-                <a:round/>
-                <a:headEnd type="none" w="sm" len="sm"/>
-                <a:tailEnd type="none" w="sm" len="sm"/>
-              </a:ln>
-            </p:spPr>
-            <p:txBody>
-              <a:bodyPr spcFirstLastPara="1" wrap="square" lIns="121900" tIns="121900" rIns="121900" bIns="121900" anchor="ctr" anchorCtr="0">
-                <a:noAutofit/>
-              </a:bodyPr>
-              <a:lstStyle/>
-              <a:p>
-                <a:endParaRPr sz="2400"/>
-              </a:p>
-            </p:txBody>
-          </p:sp>
-          <p:pic>
-            <p:nvPicPr>
-              <p:cNvPr id="40" name="Google Shape;319;p25">
-                <a:extLst>
-                  <a:ext uri="{FF2B5EF4-FFF2-40B4-BE49-F238E27FC236}">
-                    <a16:creationId xmlns:a16="http://schemas.microsoft.com/office/drawing/2014/main" id="{B25C6EEF-79CD-4AA3-B6D3-0AADD6F9337A}"/>
-                  </a:ext>
-                </a:extLst>
-              </p:cNvPr>
-              <p:cNvPicPr preferRelativeResize="0"/>
-              <p:nvPr/>
-            </p:nvPicPr>
-            <p:blipFill>
-              <a:blip r:embed="rId3">
-                <a:alphaModFix/>
-              </a:blip>
-              <a:stretch>
-                <a:fillRect/>
-              </a:stretch>
-            </p:blipFill>
-            <p:spPr>
-              <a:xfrm>
-                <a:off x="1329851" y="1579725"/>
-                <a:ext cx="1051099" cy="697200"/>
-              </a:xfrm>
-              <a:prstGeom prst="rect">
-                <a:avLst/>
-              </a:prstGeom>
-              <a:noFill/>
-              <a:ln w="9525" cap="flat" cmpd="sng">
-                <a:solidFill>
-                  <a:schemeClr val="dk2"/>
-                </a:solidFill>
-                <a:prstDash val="solid"/>
-                <a:round/>
-                <a:headEnd type="none" w="sm" len="sm"/>
-                <a:tailEnd type="none" w="sm" len="sm"/>
-              </a:ln>
-            </p:spPr>
-          </p:pic>
-          <p:pic>
-            <p:nvPicPr>
-              <p:cNvPr id="41" name="Google Shape;320;p25">
-                <a:extLst>
-                  <a:ext uri="{FF2B5EF4-FFF2-40B4-BE49-F238E27FC236}">
-                    <a16:creationId xmlns:a16="http://schemas.microsoft.com/office/drawing/2014/main" id="{CAF586BD-027B-4CAA-B857-7CAA59B240D6}"/>
-                  </a:ext>
-                </a:extLst>
-              </p:cNvPr>
-              <p:cNvPicPr preferRelativeResize="0"/>
-              <p:nvPr/>
-            </p:nvPicPr>
-            <p:blipFill>
-              <a:blip r:embed="rId3">
-                <a:alphaModFix/>
-              </a:blip>
-              <a:stretch>
-                <a:fillRect/>
-              </a:stretch>
-            </p:blipFill>
-            <p:spPr>
-              <a:xfrm>
-                <a:off x="1604825" y="1799950"/>
-                <a:ext cx="1102000" cy="730950"/>
-              </a:xfrm>
-              <a:prstGeom prst="rect">
-                <a:avLst/>
-              </a:prstGeom>
-              <a:noFill/>
-              <a:ln w="9525" cap="flat" cmpd="sng">
-                <a:solidFill>
-                  <a:schemeClr val="dk2"/>
-                </a:solidFill>
-                <a:prstDash val="solid"/>
-                <a:round/>
-                <a:headEnd type="none" w="sm" len="sm"/>
-                <a:tailEnd type="none" w="sm" len="sm"/>
-              </a:ln>
-            </p:spPr>
-          </p:pic>
-          <p:pic>
-            <p:nvPicPr>
-              <p:cNvPr id="42" name="Google Shape;321;p25">
-                <a:extLst>
-                  <a:ext uri="{FF2B5EF4-FFF2-40B4-BE49-F238E27FC236}">
-                    <a16:creationId xmlns:a16="http://schemas.microsoft.com/office/drawing/2014/main" id="{B70351FF-86FA-4023-9D3C-75E4E8FDD699}"/>
-                  </a:ext>
-                </a:extLst>
-              </p:cNvPr>
-              <p:cNvPicPr preferRelativeResize="0"/>
-              <p:nvPr/>
-            </p:nvPicPr>
-            <p:blipFill>
-              <a:blip r:embed="rId3">
-                <a:alphaModFix/>
-              </a:blip>
-              <a:stretch>
-                <a:fillRect/>
-              </a:stretch>
-            </p:blipFill>
-            <p:spPr>
-              <a:xfrm>
-                <a:off x="1872975" y="2025094"/>
-                <a:ext cx="1102000" cy="730956"/>
-              </a:xfrm>
-              <a:prstGeom prst="rect">
-                <a:avLst/>
-              </a:prstGeom>
-              <a:noFill/>
-              <a:ln w="9525" cap="flat" cmpd="sng">
-                <a:solidFill>
-                  <a:schemeClr val="dk2"/>
-                </a:solidFill>
-                <a:prstDash val="solid"/>
-                <a:round/>
-                <a:headEnd type="none" w="sm" len="sm"/>
-                <a:tailEnd type="none" w="sm" len="sm"/>
-              </a:ln>
-            </p:spPr>
-          </p:pic>
-          <p:sp>
-            <p:nvSpPr>
-              <p:cNvPr id="43" name="Google Shape;322;p25">
-                <a:extLst>
-                  <a:ext uri="{FF2B5EF4-FFF2-40B4-BE49-F238E27FC236}">
-                    <a16:creationId xmlns:a16="http://schemas.microsoft.com/office/drawing/2014/main" id="{3661DEDC-8001-4BAF-80D7-B8AAC4DB0C4E}"/>
-                  </a:ext>
-                </a:extLst>
-              </p:cNvPr>
-              <p:cNvSpPr txBox="1"/>
-              <p:nvPr/>
-            </p:nvSpPr>
-            <p:spPr>
-              <a:xfrm>
-                <a:off x="1007393" y="2859598"/>
-                <a:ext cx="2170500" cy="1158191"/>
-              </a:xfrm>
-              <a:prstGeom prst="rect">
-                <a:avLst/>
-              </a:prstGeom>
-              <a:noFill/>
-              <a:ln>
-                <a:noFill/>
-              </a:ln>
-            </p:spPr>
-            <p:txBody>
-              <a:bodyPr spcFirstLastPara="1" wrap="square" lIns="121900" tIns="121900" rIns="121900" bIns="121900" anchor="t" anchorCtr="0">
-                <a:spAutoFit/>
-              </a:bodyPr>
-              <a:lstStyle/>
-              <a:p>
-                <a:pPr algn="ctr"/>
-                <a:r>
-                  <a:rPr lang="nl" sz="1200" err="1">
-                    <a:solidFill>
-                      <a:srgbClr val="666666"/>
-                    </a:solidFill>
-                  </a:rPr>
-                  <a:t>Ecoverse</a:t>
-                </a:r>
-                <a:endParaRPr sz="1200" err="1">
-                  <a:solidFill>
-                    <a:srgbClr val="666666"/>
-                  </a:solidFill>
-                </a:endParaRPr>
-              </a:p>
-            </p:txBody>
-          </p:sp>
-        </p:grpSp>
-      </p:grpSp>
       <p:grpSp>
         <p:nvGrpSpPr>
           <p:cNvPr id="54" name="Google Shape;317;p25">
@@ -9160,7 +8264,7 @@
         </p:nvGrpSpPr>
         <p:grpSpPr>
           <a:xfrm>
-            <a:off x="2469311" y="2200695"/>
+            <a:off x="2683304" y="2839065"/>
             <a:ext cx="1760423" cy="1311345"/>
             <a:chOff x="785118" y="1200193"/>
             <a:chExt cx="2615100" cy="2817900"/>
@@ -9395,7 +8499,7 @@
         </p:blipFill>
         <p:spPr>
           <a:xfrm>
-            <a:off x="463302" y="1215459"/>
+            <a:off x="824249" y="2646880"/>
             <a:ext cx="779211" cy="456947"/>
           </a:xfrm>
           <a:prstGeom prst="rect">
@@ -9435,7 +8539,7 @@
         </p:blipFill>
         <p:spPr>
           <a:xfrm>
-            <a:off x="451589" y="2399420"/>
+            <a:off x="812536" y="3830841"/>
             <a:ext cx="779211" cy="456947"/>
           </a:xfrm>
           <a:prstGeom prst="rect">
@@ -9475,7 +8579,7 @@
         </p:blipFill>
         <p:spPr>
           <a:xfrm>
-            <a:off x="455976" y="1812199"/>
+            <a:off x="816923" y="3243620"/>
             <a:ext cx="779211" cy="456947"/>
           </a:xfrm>
           <a:prstGeom prst="rect">
@@ -9506,12 +8610,15 @@
           <p:nvPr/>
         </p:nvSpPr>
         <p:spPr>
-          <a:xfrm rot="1880754">
-            <a:off x="1361931" y="2023509"/>
-            <a:ext cx="903755" cy="251705"/>
+          <a:xfrm>
+            <a:off x="1739851" y="3343715"/>
+            <a:ext cx="791290" cy="317095"/>
           </a:xfrm>
           <a:prstGeom prst="rightArrow">
-            <a:avLst/>
+            <a:avLst>
+              <a:gd name="adj1" fmla="val 30895"/>
+              <a:gd name="adj2" fmla="val 50000"/>
+            </a:avLst>
           </a:prstGeom>
         </p:spPr>
         <p:style>
@@ -9541,52 +8648,6 @@
       </p:sp>
       <p:sp>
         <p:nvSpPr>
-          <p:cNvPr id="64" name="Arrow: Right 63">
-            <a:extLst>
-              <a:ext uri="{FF2B5EF4-FFF2-40B4-BE49-F238E27FC236}">
-                <a16:creationId xmlns:a16="http://schemas.microsoft.com/office/drawing/2014/main" id="{57225365-FF08-46DB-9D47-0E035AD79C25}"/>
-              </a:ext>
-            </a:extLst>
-          </p:cNvPr>
-          <p:cNvSpPr/>
-          <p:nvPr/>
-        </p:nvSpPr>
-        <p:spPr>
-          <a:xfrm rot="1880754">
-            <a:off x="4279198" y="3301185"/>
-            <a:ext cx="903755" cy="251705"/>
-          </a:xfrm>
-          <a:prstGeom prst="rightArrow">
-            <a:avLst/>
-          </a:prstGeom>
-        </p:spPr>
-        <p:style>
-          <a:lnRef idx="2">
-            <a:schemeClr val="accent1">
-              <a:shade val="50000"/>
-            </a:schemeClr>
-          </a:lnRef>
-          <a:fillRef idx="1">
-            <a:schemeClr val="accent1"/>
-          </a:fillRef>
-          <a:effectRef idx="0">
-            <a:schemeClr val="accent1"/>
-          </a:effectRef>
-          <a:fontRef idx="minor">
-            <a:schemeClr val="lt1"/>
-          </a:fontRef>
-        </p:style>
-        <p:txBody>
-          <a:bodyPr rtlCol="0" anchor="ctr"/>
-          <a:lstStyle/>
-          <a:p>
-            <a:pPr algn="ctr"/>
-            <a:endParaRPr lang="en-GB"/>
-          </a:p>
-        </p:txBody>
-      </p:sp>
-      <p:sp>
-        <p:nvSpPr>
           <p:cNvPr id="65" name="Google Shape;322;p25">
             <a:extLst>
               <a:ext uri="{FF2B5EF4-FFF2-40B4-BE49-F238E27FC236}">
@@ -9599,8 +8660,8 @@
         </p:nvSpPr>
         <p:spPr>
           <a:xfrm>
-            <a:off x="2264662" y="3558285"/>
-            <a:ext cx="2135092" cy="615513"/>
+            <a:off x="2514712" y="4661888"/>
+            <a:ext cx="2467245" cy="615513"/>
           </a:xfrm>
           <a:prstGeom prst="rect">
             <a:avLst/>
@@ -9623,7 +8684,7 @@
                   <a:srgbClr val="666666"/>
                 </a:solidFill>
               </a:rPr>
-              <a:t>Ecoverses</a:t>
+              <a:t>Challenge Hub</a:t>
             </a:r>
             <a:endParaRPr lang="nl-NL" sz="2400" b="1" dirty="0">
               <a:solidFill>
@@ -9647,7 +8708,7 @@
         </p:nvSpPr>
         <p:spPr>
           <a:xfrm>
-            <a:off x="6163108" y="5136714"/>
+            <a:off x="6242500" y="4661888"/>
             <a:ext cx="4611592" cy="615513"/>
           </a:xfrm>
           <a:prstGeom prst="rect">
@@ -9666,7 +8727,7 @@
           <a:p>
             <a:pPr algn="ctr"/>
             <a:r>
-              <a:rPr lang="nl" sz="2400" b="1" dirty="0">
+              <a:rPr lang="nl" sz="2400" b="1">
                 <a:solidFill>
                   <a:srgbClr val="666666"/>
                 </a:solidFill>
@@ -9691,8 +8752,8 @@
         </p:nvSpPr>
         <p:spPr>
           <a:xfrm>
-            <a:off x="2742970" y="3082425"/>
-            <a:ext cx="1307581" cy="336781"/>
+            <a:off x="2847535" y="3715499"/>
+            <a:ext cx="1461129" cy="254305"/>
           </a:xfrm>
           <a:prstGeom prst="roundRect">
             <a:avLst>
@@ -9722,12 +8783,12 @@
           <a:p>
             <a:pPr algn="ctr"/>
             <a:r>
-              <a:rPr lang="nl" sz="1400" b="1">
+              <a:rPr lang="nl" sz="1400" dirty="0">
                 <a:latin typeface="Alegreya"/>
               </a:rPr>
               <a:t>Community</a:t>
             </a:r>
-            <a:endParaRPr lang="en-US" sz="1400" b="1">
+            <a:endParaRPr lang="en-US" sz="1400" dirty="0">
               <a:latin typeface="Alegreya"/>
             </a:endParaRPr>
           </a:p>
@@ -9747,7 +8808,7 @@
         </p:nvSpPr>
         <p:spPr>
           <a:xfrm>
-            <a:off x="-116216" y="2877648"/>
+            <a:off x="186623" y="4661888"/>
             <a:ext cx="2135092" cy="615513"/>
           </a:xfrm>
           <a:prstGeom prst="rect">
@@ -9781,6 +8842,1163 @@
           </a:p>
         </p:txBody>
       </p:sp>
+      <p:grpSp>
+        <p:nvGrpSpPr>
+          <p:cNvPr id="3" name="Group 2">
+            <a:extLst>
+              <a:ext uri="{FF2B5EF4-FFF2-40B4-BE49-F238E27FC236}">
+                <a16:creationId xmlns:a16="http://schemas.microsoft.com/office/drawing/2014/main" id="{C89079F1-6A6C-4CC3-BC1D-E955FF2CB6AC}"/>
+              </a:ext>
+            </a:extLst>
+          </p:cNvPr>
+          <p:cNvGrpSpPr/>
+          <p:nvPr/>
+        </p:nvGrpSpPr>
+        <p:grpSpPr>
+          <a:xfrm>
+            <a:off x="5336849" y="2066781"/>
+            <a:ext cx="6636997" cy="2521724"/>
+            <a:chOff x="5307352" y="2656716"/>
+            <a:chExt cx="6636997" cy="2521724"/>
+          </a:xfrm>
+        </p:grpSpPr>
+        <p:sp>
+          <p:nvSpPr>
+            <p:cNvPr id="23" name="Google Shape;301;p25">
+              <a:extLst>
+                <a:ext uri="{FF2B5EF4-FFF2-40B4-BE49-F238E27FC236}">
+                  <a16:creationId xmlns:a16="http://schemas.microsoft.com/office/drawing/2014/main" id="{1114D5A7-7286-4C8E-B146-E3B79BF4A6A8}"/>
+                </a:ext>
+              </a:extLst>
+            </p:cNvPr>
+            <p:cNvSpPr/>
+            <p:nvPr/>
+          </p:nvSpPr>
+          <p:spPr>
+            <a:xfrm>
+              <a:off x="5307352" y="2860500"/>
+              <a:ext cx="6636997" cy="2317940"/>
+            </a:xfrm>
+            <a:prstGeom prst="roundRect">
+              <a:avLst>
+                <a:gd name="adj" fmla="val 16667"/>
+              </a:avLst>
+            </a:prstGeom>
+            <a:solidFill>
+              <a:schemeClr val="lt2"/>
+            </a:solidFill>
+            <a:ln w="9525" cap="flat" cmpd="sng">
+              <a:solidFill>
+                <a:schemeClr val="dk2"/>
+              </a:solidFill>
+              <a:prstDash val="solid"/>
+              <a:round/>
+              <a:headEnd type="none" w="sm" len="sm"/>
+              <a:tailEnd type="none" w="sm" len="sm"/>
+            </a:ln>
+          </p:spPr>
+          <p:txBody>
+            <a:bodyPr spcFirstLastPara="1" wrap="square" lIns="121900" tIns="121900" rIns="121900" bIns="121900" anchor="ctr" anchorCtr="0">
+              <a:noAutofit/>
+            </a:bodyPr>
+            <a:lstStyle/>
+            <a:p>
+              <a:endParaRPr sz="2400"/>
+            </a:p>
+          </p:txBody>
+        </p:sp>
+        <p:cxnSp>
+          <p:nvCxnSpPr>
+            <p:cNvPr id="24" name="Google Shape;302;p25">
+              <a:extLst>
+                <a:ext uri="{FF2B5EF4-FFF2-40B4-BE49-F238E27FC236}">
+                  <a16:creationId xmlns:a16="http://schemas.microsoft.com/office/drawing/2014/main" id="{52CEA8E2-F52F-4ECF-AE82-4C9B6776B72B}"/>
+                </a:ext>
+              </a:extLst>
+            </p:cNvPr>
+            <p:cNvCxnSpPr>
+              <a:cxnSpLocks/>
+            </p:cNvCxnSpPr>
+            <p:nvPr/>
+          </p:nvCxnSpPr>
+          <p:spPr>
+            <a:xfrm>
+              <a:off x="8776071" y="3921610"/>
+              <a:ext cx="1313066" cy="0"/>
+            </a:xfrm>
+            <a:prstGeom prst="straightConnector1">
+              <a:avLst/>
+            </a:prstGeom>
+            <a:noFill/>
+            <a:ln w="76200" cap="flat" cmpd="sng">
+              <a:solidFill>
+                <a:srgbClr val="00BCD4"/>
+              </a:solidFill>
+              <a:prstDash val="dot"/>
+              <a:round/>
+              <a:headEnd type="none" w="med" len="med"/>
+              <a:tailEnd type="none" w="med" len="med"/>
+            </a:ln>
+          </p:spPr>
+        </p:cxnSp>
+        <p:sp>
+          <p:nvSpPr>
+            <p:cNvPr id="25" name="Google Shape;303;p25">
+              <a:extLst>
+                <a:ext uri="{FF2B5EF4-FFF2-40B4-BE49-F238E27FC236}">
+                  <a16:creationId xmlns:a16="http://schemas.microsoft.com/office/drawing/2014/main" id="{049F7526-826F-4129-A543-B85E183A74D0}"/>
+                </a:ext>
+              </a:extLst>
+            </p:cNvPr>
+            <p:cNvSpPr txBox="1"/>
+            <p:nvPr/>
+          </p:nvSpPr>
+          <p:spPr>
+            <a:xfrm>
+              <a:off x="6015825" y="2656716"/>
+              <a:ext cx="5204504" cy="615513"/>
+            </a:xfrm>
+            <a:prstGeom prst="rect">
+              <a:avLst/>
+            </a:prstGeom>
+            <a:noFill/>
+            <a:ln>
+              <a:noFill/>
+            </a:ln>
+          </p:spPr>
+          <p:txBody>
+            <a:bodyPr spcFirstLastPara="1" wrap="square" lIns="121900" tIns="121900" rIns="121900" bIns="121900" anchor="t" anchorCtr="0">
+              <a:spAutoFit/>
+            </a:bodyPr>
+            <a:lstStyle/>
+            <a:p>
+              <a:pPr algn="ctr"/>
+              <a:endParaRPr lang="nl" sz="2400">
+                <a:latin typeface="Alegreya"/>
+              </a:endParaRPr>
+            </a:p>
+          </p:txBody>
+        </p:sp>
+        <p:sp>
+          <p:nvSpPr>
+            <p:cNvPr id="26" name="Google Shape;304;p25">
+              <a:extLst>
+                <a:ext uri="{FF2B5EF4-FFF2-40B4-BE49-F238E27FC236}">
+                  <a16:creationId xmlns:a16="http://schemas.microsoft.com/office/drawing/2014/main" id="{03C365CD-E4EB-4774-B85F-6F4E106A0AB9}"/>
+                </a:ext>
+              </a:extLst>
+            </p:cNvPr>
+            <p:cNvSpPr/>
+            <p:nvPr/>
+          </p:nvSpPr>
+          <p:spPr>
+            <a:xfrm>
+              <a:off x="5618160" y="4610507"/>
+              <a:ext cx="6097590" cy="370800"/>
+            </a:xfrm>
+            <a:prstGeom prst="roundRect">
+              <a:avLst>
+                <a:gd name="adj" fmla="val 16667"/>
+              </a:avLst>
+            </a:prstGeom>
+            <a:solidFill>
+              <a:srgbClr val="00BCD4">
+                <a:alpha val="28430"/>
+              </a:srgbClr>
+            </a:solidFill>
+            <a:ln w="9525" cap="flat" cmpd="sng">
+              <a:solidFill>
+                <a:schemeClr val="dk2"/>
+              </a:solidFill>
+              <a:prstDash val="solid"/>
+              <a:round/>
+              <a:headEnd type="none" w="sm" len="sm"/>
+              <a:tailEnd type="none" w="sm" len="sm"/>
+            </a:ln>
+          </p:spPr>
+          <p:txBody>
+            <a:bodyPr spcFirstLastPara="1" wrap="square" lIns="121900" tIns="121900" rIns="121900" bIns="121900" anchor="ctr" anchorCtr="0">
+              <a:noAutofit/>
+            </a:bodyPr>
+            <a:lstStyle/>
+            <a:p>
+              <a:pPr algn="ctr"/>
+              <a:r>
+                <a:rPr lang="nl" sz="2400">
+                  <a:latin typeface="Alegreya"/>
+                </a:rPr>
+                <a:t>Community</a:t>
+              </a:r>
+              <a:endParaRPr sz="1600">
+                <a:latin typeface="Alegreya"/>
+              </a:endParaRPr>
+            </a:p>
+          </p:txBody>
+        </p:sp>
+        <p:grpSp>
+          <p:nvGrpSpPr>
+            <p:cNvPr id="2" name="Group 1">
+              <a:extLst>
+                <a:ext uri="{FF2B5EF4-FFF2-40B4-BE49-F238E27FC236}">
+                  <a16:creationId xmlns:a16="http://schemas.microsoft.com/office/drawing/2014/main" id="{779FCEFB-BEBF-45A1-A512-81988EFC4589}"/>
+                </a:ext>
+              </a:extLst>
+            </p:cNvPr>
+            <p:cNvGrpSpPr/>
+            <p:nvPr/>
+          </p:nvGrpSpPr>
+          <p:grpSpPr>
+            <a:xfrm>
+              <a:off x="5644195" y="3240019"/>
+              <a:ext cx="1411681" cy="1231024"/>
+              <a:chOff x="3117237" y="4921631"/>
+              <a:chExt cx="1411681" cy="1231024"/>
+            </a:xfrm>
+          </p:grpSpPr>
+          <p:grpSp>
+            <p:nvGrpSpPr>
+              <p:cNvPr id="27" name="Google Shape;305;p25">
+                <a:extLst>
+                  <a:ext uri="{FF2B5EF4-FFF2-40B4-BE49-F238E27FC236}">
+                    <a16:creationId xmlns:a16="http://schemas.microsoft.com/office/drawing/2014/main" id="{AE63C97F-0366-4C69-BED2-726C63457962}"/>
+                  </a:ext>
+                </a:extLst>
+              </p:cNvPr>
+              <p:cNvGrpSpPr/>
+              <p:nvPr/>
+            </p:nvGrpSpPr>
+            <p:grpSpPr>
+              <a:xfrm>
+                <a:off x="3117237" y="4921631"/>
+                <a:ext cx="1411681" cy="1231024"/>
+                <a:chOff x="785119" y="1200193"/>
+                <a:chExt cx="3031093" cy="3309204"/>
+              </a:xfrm>
+            </p:grpSpPr>
+            <p:sp>
+              <p:nvSpPr>
+                <p:cNvPr id="49" name="Google Shape;306;p25">
+                  <a:extLst>
+                    <a:ext uri="{FF2B5EF4-FFF2-40B4-BE49-F238E27FC236}">
+                      <a16:creationId xmlns:a16="http://schemas.microsoft.com/office/drawing/2014/main" id="{6FAF7101-4D9D-4C55-AB5C-65111B2758DB}"/>
+                    </a:ext>
+                  </a:extLst>
+                </p:cNvPr>
+                <p:cNvSpPr/>
+                <p:nvPr/>
+              </p:nvSpPr>
+              <p:spPr>
+                <a:xfrm>
+                  <a:off x="785119" y="1200193"/>
+                  <a:ext cx="3031093" cy="3110819"/>
+                </a:xfrm>
+                <a:prstGeom prst="roundRect">
+                  <a:avLst>
+                    <a:gd name="adj" fmla="val 16667"/>
+                  </a:avLst>
+                </a:prstGeom>
+                <a:solidFill>
+                  <a:srgbClr val="CCCCCC"/>
+                </a:solidFill>
+                <a:ln w="28575" cap="flat" cmpd="sng">
+                  <a:solidFill>
+                    <a:schemeClr val="dk2"/>
+                  </a:solidFill>
+                  <a:prstDash val="solid"/>
+                  <a:round/>
+                  <a:headEnd type="none" w="sm" len="sm"/>
+                  <a:tailEnd type="none" w="sm" len="sm"/>
+                </a:ln>
+              </p:spPr>
+              <p:txBody>
+                <a:bodyPr spcFirstLastPara="1" wrap="square" lIns="121900" tIns="121900" rIns="121900" bIns="121900" anchor="ctr" anchorCtr="0">
+                  <a:noAutofit/>
+                </a:bodyPr>
+                <a:lstStyle/>
+                <a:p>
+                  <a:endParaRPr sz="2400"/>
+                </a:p>
+              </p:txBody>
+            </p:sp>
+            <p:pic>
+              <p:nvPicPr>
+                <p:cNvPr id="50" name="Google Shape;307;p25">
+                  <a:extLst>
+                    <a:ext uri="{FF2B5EF4-FFF2-40B4-BE49-F238E27FC236}">
+                      <a16:creationId xmlns:a16="http://schemas.microsoft.com/office/drawing/2014/main" id="{FF18FF2C-5BB2-4628-BDB5-97CF985C2CBF}"/>
+                    </a:ext>
+                  </a:extLst>
+                </p:cNvPr>
+                <p:cNvPicPr preferRelativeResize="0"/>
+                <p:nvPr/>
+              </p:nvPicPr>
+              <p:blipFill>
+                <a:blip r:embed="rId3">
+                  <a:alphaModFix/>
+                </a:blip>
+                <a:stretch>
+                  <a:fillRect/>
+                </a:stretch>
+              </p:blipFill>
+              <p:spPr>
+                <a:xfrm>
+                  <a:off x="1533670" y="1587494"/>
+                  <a:ext cx="1051099" cy="697199"/>
+                </a:xfrm>
+                <a:prstGeom prst="rect">
+                  <a:avLst/>
+                </a:prstGeom>
+                <a:noFill/>
+                <a:ln w="9525" cap="flat" cmpd="sng">
+                  <a:solidFill>
+                    <a:schemeClr val="dk2"/>
+                  </a:solidFill>
+                  <a:prstDash val="solid"/>
+                  <a:round/>
+                  <a:headEnd type="none" w="sm" len="sm"/>
+                  <a:tailEnd type="none" w="sm" len="sm"/>
+                </a:ln>
+              </p:spPr>
+            </p:pic>
+            <p:pic>
+              <p:nvPicPr>
+                <p:cNvPr id="51" name="Google Shape;308;p25">
+                  <a:extLst>
+                    <a:ext uri="{FF2B5EF4-FFF2-40B4-BE49-F238E27FC236}">
+                      <a16:creationId xmlns:a16="http://schemas.microsoft.com/office/drawing/2014/main" id="{4DBD3EF3-9676-41C0-B930-E4A8CDAA611A}"/>
+                    </a:ext>
+                  </a:extLst>
+                </p:cNvPr>
+                <p:cNvPicPr preferRelativeResize="0"/>
+                <p:nvPr/>
+              </p:nvPicPr>
+              <p:blipFill>
+                <a:blip r:embed="rId3">
+                  <a:alphaModFix/>
+                </a:blip>
+                <a:stretch>
+                  <a:fillRect/>
+                </a:stretch>
+              </p:blipFill>
+              <p:spPr>
+                <a:xfrm>
+                  <a:off x="1808643" y="1807720"/>
+                  <a:ext cx="1102000" cy="730949"/>
+                </a:xfrm>
+                <a:prstGeom prst="rect">
+                  <a:avLst/>
+                </a:prstGeom>
+                <a:noFill/>
+                <a:ln w="9525" cap="flat" cmpd="sng">
+                  <a:solidFill>
+                    <a:schemeClr val="dk2"/>
+                  </a:solidFill>
+                  <a:prstDash val="solid"/>
+                  <a:round/>
+                  <a:headEnd type="none" w="sm" len="sm"/>
+                  <a:tailEnd type="none" w="sm" len="sm"/>
+                </a:ln>
+              </p:spPr>
+            </p:pic>
+            <p:pic>
+              <p:nvPicPr>
+                <p:cNvPr id="52" name="Google Shape;309;p25">
+                  <a:extLst>
+                    <a:ext uri="{FF2B5EF4-FFF2-40B4-BE49-F238E27FC236}">
+                      <a16:creationId xmlns:a16="http://schemas.microsoft.com/office/drawing/2014/main" id="{6B3D20AF-88A3-411A-B8E3-93471556BB78}"/>
+                    </a:ext>
+                  </a:extLst>
+                </p:cNvPr>
+                <p:cNvPicPr preferRelativeResize="0"/>
+                <p:nvPr/>
+              </p:nvPicPr>
+              <p:blipFill>
+                <a:blip r:embed="rId3">
+                  <a:alphaModFix/>
+                </a:blip>
+                <a:stretch>
+                  <a:fillRect/>
+                </a:stretch>
+              </p:blipFill>
+              <p:spPr>
+                <a:xfrm>
+                  <a:off x="2076794" y="2032862"/>
+                  <a:ext cx="1102000" cy="730957"/>
+                </a:xfrm>
+                <a:prstGeom prst="rect">
+                  <a:avLst/>
+                </a:prstGeom>
+                <a:noFill/>
+                <a:ln w="9525" cap="flat" cmpd="sng">
+                  <a:solidFill>
+                    <a:schemeClr val="dk2"/>
+                  </a:solidFill>
+                  <a:prstDash val="solid"/>
+                  <a:round/>
+                  <a:headEnd type="none" w="sm" len="sm"/>
+                  <a:tailEnd type="none" w="sm" len="sm"/>
+                </a:ln>
+              </p:spPr>
+            </p:pic>
+            <p:sp>
+              <p:nvSpPr>
+                <p:cNvPr id="53" name="Google Shape;310;p25">
+                  <a:extLst>
+                    <a:ext uri="{FF2B5EF4-FFF2-40B4-BE49-F238E27FC236}">
+                      <a16:creationId xmlns:a16="http://schemas.microsoft.com/office/drawing/2014/main" id="{32B2E681-F8D9-4E8B-B8E1-CDF024CFD296}"/>
+                    </a:ext>
+                  </a:extLst>
+                </p:cNvPr>
+                <p:cNvSpPr txBox="1"/>
+                <p:nvPr/>
+              </p:nvSpPr>
+              <p:spPr>
+                <a:xfrm>
+                  <a:off x="1159164" y="3351206"/>
+                  <a:ext cx="2170500" cy="1158191"/>
+                </a:xfrm>
+                <a:prstGeom prst="rect">
+                  <a:avLst/>
+                </a:prstGeom>
+                <a:noFill/>
+                <a:ln>
+                  <a:noFill/>
+                </a:ln>
+              </p:spPr>
+              <p:txBody>
+                <a:bodyPr spcFirstLastPara="1" wrap="square" lIns="121900" tIns="121900" rIns="121900" bIns="121900" anchor="t" anchorCtr="0">
+                  <a:spAutoFit/>
+                </a:bodyPr>
+                <a:lstStyle/>
+                <a:p>
+                  <a:pPr algn="ctr"/>
+                  <a:r>
+                    <a:rPr lang="nl" sz="1200" b="1">
+                      <a:solidFill>
+                        <a:srgbClr val="666666"/>
+                      </a:solidFill>
+                    </a:rPr>
+                    <a:t>Hub #1</a:t>
+                  </a:r>
+                  <a:endParaRPr sz="1200" b="1" err="1">
+                    <a:solidFill>
+                      <a:srgbClr val="666666"/>
+                    </a:solidFill>
+                  </a:endParaRPr>
+                </a:p>
+              </p:txBody>
+            </p:sp>
+          </p:grpSp>
+          <p:sp>
+            <p:nvSpPr>
+              <p:cNvPr id="69" name="Google Shape;304;p25">
+                <a:extLst>
+                  <a:ext uri="{FF2B5EF4-FFF2-40B4-BE49-F238E27FC236}">
+                    <a16:creationId xmlns:a16="http://schemas.microsoft.com/office/drawing/2014/main" id="{287B9EE4-B9A1-4D0E-AF70-0873ABEB5E15}"/>
+                  </a:ext>
+                </a:extLst>
+              </p:cNvPr>
+              <p:cNvSpPr/>
+              <p:nvPr/>
+            </p:nvSpPr>
+            <p:spPr>
+              <a:xfrm>
+                <a:off x="3233173" y="5584163"/>
+                <a:ext cx="1163360" cy="217107"/>
+              </a:xfrm>
+              <a:prstGeom prst="roundRect">
+                <a:avLst>
+                  <a:gd name="adj" fmla="val 16667"/>
+                </a:avLst>
+              </a:prstGeom>
+              <a:solidFill>
+                <a:srgbClr val="00BCD4">
+                  <a:alpha val="28430"/>
+                </a:srgbClr>
+              </a:solidFill>
+              <a:ln w="9525" cap="flat" cmpd="sng">
+                <a:solidFill>
+                  <a:schemeClr val="dk2"/>
+                </a:solidFill>
+                <a:prstDash val="solid"/>
+                <a:round/>
+                <a:headEnd type="none" w="sm" len="sm"/>
+                <a:tailEnd type="none" w="sm" len="sm"/>
+              </a:ln>
+            </p:spPr>
+            <p:txBody>
+              <a:bodyPr spcFirstLastPara="1" wrap="square" lIns="121900" tIns="121900" rIns="121900" bIns="121900" anchor="ctr" anchorCtr="0">
+                <a:noAutofit/>
+              </a:bodyPr>
+              <a:lstStyle/>
+              <a:p>
+                <a:pPr algn="ctr"/>
+                <a:r>
+                  <a:rPr lang="nl" sz="1200">
+                    <a:latin typeface="Alegreya"/>
+                  </a:rPr>
+                  <a:t>Community</a:t>
+                </a:r>
+                <a:endParaRPr lang="en-US" sz="1200">
+                  <a:latin typeface="Alegreya"/>
+                </a:endParaRPr>
+              </a:p>
+            </p:txBody>
+          </p:sp>
+        </p:grpSp>
+        <p:grpSp>
+          <p:nvGrpSpPr>
+            <p:cNvPr id="70" name="Group 69">
+              <a:extLst>
+                <a:ext uri="{FF2B5EF4-FFF2-40B4-BE49-F238E27FC236}">
+                  <a16:creationId xmlns:a16="http://schemas.microsoft.com/office/drawing/2014/main" id="{366F79ED-8235-4395-A711-4A73254C5219}"/>
+                </a:ext>
+              </a:extLst>
+            </p:cNvPr>
+            <p:cNvGrpSpPr/>
+            <p:nvPr/>
+          </p:nvGrpSpPr>
+          <p:grpSpPr>
+            <a:xfrm>
+              <a:off x="10304069" y="3272751"/>
+              <a:ext cx="1411681" cy="1231024"/>
+              <a:chOff x="3117237" y="4921631"/>
+              <a:chExt cx="1411681" cy="1231024"/>
+            </a:xfrm>
+          </p:grpSpPr>
+          <p:grpSp>
+            <p:nvGrpSpPr>
+              <p:cNvPr id="71" name="Google Shape;305;p25">
+                <a:extLst>
+                  <a:ext uri="{FF2B5EF4-FFF2-40B4-BE49-F238E27FC236}">
+                    <a16:creationId xmlns:a16="http://schemas.microsoft.com/office/drawing/2014/main" id="{3BE6E1D4-0836-44BF-A875-D9D3C00E83DF}"/>
+                  </a:ext>
+                </a:extLst>
+              </p:cNvPr>
+              <p:cNvGrpSpPr/>
+              <p:nvPr/>
+            </p:nvGrpSpPr>
+            <p:grpSpPr>
+              <a:xfrm>
+                <a:off x="3117237" y="4921631"/>
+                <a:ext cx="1411681" cy="1231024"/>
+                <a:chOff x="785119" y="1200193"/>
+                <a:chExt cx="3031093" cy="3309204"/>
+              </a:xfrm>
+            </p:grpSpPr>
+            <p:sp>
+              <p:nvSpPr>
+                <p:cNvPr id="73" name="Google Shape;306;p25">
+                  <a:extLst>
+                    <a:ext uri="{FF2B5EF4-FFF2-40B4-BE49-F238E27FC236}">
+                      <a16:creationId xmlns:a16="http://schemas.microsoft.com/office/drawing/2014/main" id="{8088F358-669F-4B77-8C33-D62CB09A84F1}"/>
+                    </a:ext>
+                  </a:extLst>
+                </p:cNvPr>
+                <p:cNvSpPr/>
+                <p:nvPr/>
+              </p:nvSpPr>
+              <p:spPr>
+                <a:xfrm>
+                  <a:off x="785119" y="1200193"/>
+                  <a:ext cx="3031093" cy="3110819"/>
+                </a:xfrm>
+                <a:prstGeom prst="roundRect">
+                  <a:avLst>
+                    <a:gd name="adj" fmla="val 16667"/>
+                  </a:avLst>
+                </a:prstGeom>
+                <a:solidFill>
+                  <a:srgbClr val="CCCCCC"/>
+                </a:solidFill>
+                <a:ln w="28575" cap="flat" cmpd="sng">
+                  <a:solidFill>
+                    <a:schemeClr val="dk2"/>
+                  </a:solidFill>
+                  <a:prstDash val="solid"/>
+                  <a:round/>
+                  <a:headEnd type="none" w="sm" len="sm"/>
+                  <a:tailEnd type="none" w="sm" len="sm"/>
+                </a:ln>
+              </p:spPr>
+              <p:txBody>
+                <a:bodyPr spcFirstLastPara="1" wrap="square" lIns="121900" tIns="121900" rIns="121900" bIns="121900" anchor="ctr" anchorCtr="0">
+                  <a:noAutofit/>
+                </a:bodyPr>
+                <a:lstStyle/>
+                <a:p>
+                  <a:endParaRPr sz="2400"/>
+                </a:p>
+              </p:txBody>
+            </p:sp>
+            <p:pic>
+              <p:nvPicPr>
+                <p:cNvPr id="74" name="Google Shape;307;p25">
+                  <a:extLst>
+                    <a:ext uri="{FF2B5EF4-FFF2-40B4-BE49-F238E27FC236}">
+                      <a16:creationId xmlns:a16="http://schemas.microsoft.com/office/drawing/2014/main" id="{BB5DDD1C-765C-4204-A3FF-008309955930}"/>
+                    </a:ext>
+                  </a:extLst>
+                </p:cNvPr>
+                <p:cNvPicPr preferRelativeResize="0"/>
+                <p:nvPr/>
+              </p:nvPicPr>
+              <p:blipFill>
+                <a:blip r:embed="rId3">
+                  <a:alphaModFix/>
+                </a:blip>
+                <a:stretch>
+                  <a:fillRect/>
+                </a:stretch>
+              </p:blipFill>
+              <p:spPr>
+                <a:xfrm>
+                  <a:off x="1533670" y="1587494"/>
+                  <a:ext cx="1051099" cy="697199"/>
+                </a:xfrm>
+                <a:prstGeom prst="rect">
+                  <a:avLst/>
+                </a:prstGeom>
+                <a:noFill/>
+                <a:ln w="9525" cap="flat" cmpd="sng">
+                  <a:solidFill>
+                    <a:schemeClr val="dk2"/>
+                  </a:solidFill>
+                  <a:prstDash val="solid"/>
+                  <a:round/>
+                  <a:headEnd type="none" w="sm" len="sm"/>
+                  <a:tailEnd type="none" w="sm" len="sm"/>
+                </a:ln>
+              </p:spPr>
+            </p:pic>
+            <p:pic>
+              <p:nvPicPr>
+                <p:cNvPr id="75" name="Google Shape;308;p25">
+                  <a:extLst>
+                    <a:ext uri="{FF2B5EF4-FFF2-40B4-BE49-F238E27FC236}">
+                      <a16:creationId xmlns:a16="http://schemas.microsoft.com/office/drawing/2014/main" id="{E623C02F-714F-4023-A7BF-0CC47E036BE6}"/>
+                    </a:ext>
+                  </a:extLst>
+                </p:cNvPr>
+                <p:cNvPicPr preferRelativeResize="0"/>
+                <p:nvPr/>
+              </p:nvPicPr>
+              <p:blipFill>
+                <a:blip r:embed="rId3">
+                  <a:alphaModFix/>
+                </a:blip>
+                <a:stretch>
+                  <a:fillRect/>
+                </a:stretch>
+              </p:blipFill>
+              <p:spPr>
+                <a:xfrm>
+                  <a:off x="1808643" y="1807720"/>
+                  <a:ext cx="1102000" cy="730949"/>
+                </a:xfrm>
+                <a:prstGeom prst="rect">
+                  <a:avLst/>
+                </a:prstGeom>
+                <a:noFill/>
+                <a:ln w="9525" cap="flat" cmpd="sng">
+                  <a:solidFill>
+                    <a:schemeClr val="dk2"/>
+                  </a:solidFill>
+                  <a:prstDash val="solid"/>
+                  <a:round/>
+                  <a:headEnd type="none" w="sm" len="sm"/>
+                  <a:tailEnd type="none" w="sm" len="sm"/>
+                </a:ln>
+              </p:spPr>
+            </p:pic>
+            <p:pic>
+              <p:nvPicPr>
+                <p:cNvPr id="76" name="Google Shape;309;p25">
+                  <a:extLst>
+                    <a:ext uri="{FF2B5EF4-FFF2-40B4-BE49-F238E27FC236}">
+                      <a16:creationId xmlns:a16="http://schemas.microsoft.com/office/drawing/2014/main" id="{C2C32F09-1471-4213-BD63-32A1A72E9E5F}"/>
+                    </a:ext>
+                  </a:extLst>
+                </p:cNvPr>
+                <p:cNvPicPr preferRelativeResize="0"/>
+                <p:nvPr/>
+              </p:nvPicPr>
+              <p:blipFill>
+                <a:blip r:embed="rId3">
+                  <a:alphaModFix/>
+                </a:blip>
+                <a:stretch>
+                  <a:fillRect/>
+                </a:stretch>
+              </p:blipFill>
+              <p:spPr>
+                <a:xfrm>
+                  <a:off x="2076794" y="2032862"/>
+                  <a:ext cx="1102000" cy="730957"/>
+                </a:xfrm>
+                <a:prstGeom prst="rect">
+                  <a:avLst/>
+                </a:prstGeom>
+                <a:noFill/>
+                <a:ln w="9525" cap="flat" cmpd="sng">
+                  <a:solidFill>
+                    <a:schemeClr val="dk2"/>
+                  </a:solidFill>
+                  <a:prstDash val="solid"/>
+                  <a:round/>
+                  <a:headEnd type="none" w="sm" len="sm"/>
+                  <a:tailEnd type="none" w="sm" len="sm"/>
+                </a:ln>
+              </p:spPr>
+            </p:pic>
+            <p:sp>
+              <p:nvSpPr>
+                <p:cNvPr id="77" name="Google Shape;310;p25">
+                  <a:extLst>
+                    <a:ext uri="{FF2B5EF4-FFF2-40B4-BE49-F238E27FC236}">
+                      <a16:creationId xmlns:a16="http://schemas.microsoft.com/office/drawing/2014/main" id="{4E75DEC4-D88C-42AF-8D52-FC6F07D01B0C}"/>
+                    </a:ext>
+                  </a:extLst>
+                </p:cNvPr>
+                <p:cNvSpPr txBox="1"/>
+                <p:nvPr/>
+              </p:nvSpPr>
+              <p:spPr>
+                <a:xfrm>
+                  <a:off x="1159164" y="3351206"/>
+                  <a:ext cx="2170500" cy="1158191"/>
+                </a:xfrm>
+                <a:prstGeom prst="rect">
+                  <a:avLst/>
+                </a:prstGeom>
+                <a:noFill/>
+                <a:ln>
+                  <a:noFill/>
+                </a:ln>
+              </p:spPr>
+              <p:txBody>
+                <a:bodyPr spcFirstLastPara="1" wrap="square" lIns="121900" tIns="121900" rIns="121900" bIns="121900" anchor="t" anchorCtr="0">
+                  <a:spAutoFit/>
+                </a:bodyPr>
+                <a:lstStyle/>
+                <a:p>
+                  <a:pPr algn="ctr"/>
+                  <a:r>
+                    <a:rPr lang="nl" sz="1200" b="1">
+                      <a:solidFill>
+                        <a:srgbClr val="666666"/>
+                      </a:solidFill>
+                    </a:rPr>
+                    <a:t>Hub #n</a:t>
+                  </a:r>
+                  <a:endParaRPr sz="1200" b="1" err="1">
+                    <a:solidFill>
+                      <a:srgbClr val="666666"/>
+                    </a:solidFill>
+                  </a:endParaRPr>
+                </a:p>
+              </p:txBody>
+            </p:sp>
+          </p:grpSp>
+          <p:sp>
+            <p:nvSpPr>
+              <p:cNvPr id="72" name="Google Shape;304;p25">
+                <a:extLst>
+                  <a:ext uri="{FF2B5EF4-FFF2-40B4-BE49-F238E27FC236}">
+                    <a16:creationId xmlns:a16="http://schemas.microsoft.com/office/drawing/2014/main" id="{1DDAA795-09B4-41CF-8CF2-4367F64BEBB0}"/>
+                  </a:ext>
+                </a:extLst>
+              </p:cNvPr>
+              <p:cNvSpPr/>
+              <p:nvPr/>
+            </p:nvSpPr>
+            <p:spPr>
+              <a:xfrm>
+                <a:off x="3233173" y="5584163"/>
+                <a:ext cx="1163360" cy="217107"/>
+              </a:xfrm>
+              <a:prstGeom prst="roundRect">
+                <a:avLst>
+                  <a:gd name="adj" fmla="val 16667"/>
+                </a:avLst>
+              </a:prstGeom>
+              <a:solidFill>
+                <a:srgbClr val="00BCD4">
+                  <a:alpha val="28430"/>
+                </a:srgbClr>
+              </a:solidFill>
+              <a:ln w="9525" cap="flat" cmpd="sng">
+                <a:solidFill>
+                  <a:schemeClr val="dk2"/>
+                </a:solidFill>
+                <a:prstDash val="solid"/>
+                <a:round/>
+                <a:headEnd type="none" w="sm" len="sm"/>
+                <a:tailEnd type="none" w="sm" len="sm"/>
+              </a:ln>
+            </p:spPr>
+            <p:txBody>
+              <a:bodyPr spcFirstLastPara="1" wrap="square" lIns="121900" tIns="121900" rIns="121900" bIns="121900" anchor="ctr" anchorCtr="0">
+                <a:noAutofit/>
+              </a:bodyPr>
+              <a:lstStyle/>
+              <a:p>
+                <a:pPr algn="ctr"/>
+                <a:r>
+                  <a:rPr lang="nl" sz="1200">
+                    <a:latin typeface="Alegreya"/>
+                  </a:rPr>
+                  <a:t>Community</a:t>
+                </a:r>
+                <a:endParaRPr lang="en-US" sz="1200">
+                  <a:latin typeface="Alegreya"/>
+                </a:endParaRPr>
+              </a:p>
+            </p:txBody>
+          </p:sp>
+        </p:grpSp>
+        <p:grpSp>
+          <p:nvGrpSpPr>
+            <p:cNvPr id="78" name="Group 77">
+              <a:extLst>
+                <a:ext uri="{FF2B5EF4-FFF2-40B4-BE49-F238E27FC236}">
+                  <a16:creationId xmlns:a16="http://schemas.microsoft.com/office/drawing/2014/main" id="{90CD8590-366C-4A04-8724-F03AB057F098}"/>
+                </a:ext>
+              </a:extLst>
+            </p:cNvPr>
+            <p:cNvGrpSpPr/>
+            <p:nvPr/>
+          </p:nvGrpSpPr>
+          <p:grpSpPr>
+            <a:xfrm>
+              <a:off x="7239503" y="3240019"/>
+              <a:ext cx="1411681" cy="1231024"/>
+              <a:chOff x="3117237" y="4921631"/>
+              <a:chExt cx="1411681" cy="1231024"/>
+            </a:xfrm>
+          </p:grpSpPr>
+          <p:grpSp>
+            <p:nvGrpSpPr>
+              <p:cNvPr id="79" name="Google Shape;305;p25">
+                <a:extLst>
+                  <a:ext uri="{FF2B5EF4-FFF2-40B4-BE49-F238E27FC236}">
+                    <a16:creationId xmlns:a16="http://schemas.microsoft.com/office/drawing/2014/main" id="{F49B1059-1BAC-4440-A51B-6432AE0444A8}"/>
+                  </a:ext>
+                </a:extLst>
+              </p:cNvPr>
+              <p:cNvGrpSpPr/>
+              <p:nvPr/>
+            </p:nvGrpSpPr>
+            <p:grpSpPr>
+              <a:xfrm>
+                <a:off x="3117237" y="4921631"/>
+                <a:ext cx="1411681" cy="1231024"/>
+                <a:chOff x="785119" y="1200193"/>
+                <a:chExt cx="3031093" cy="3309204"/>
+              </a:xfrm>
+            </p:grpSpPr>
+            <p:sp>
+              <p:nvSpPr>
+                <p:cNvPr id="81" name="Google Shape;306;p25">
+                  <a:extLst>
+                    <a:ext uri="{FF2B5EF4-FFF2-40B4-BE49-F238E27FC236}">
+                      <a16:creationId xmlns:a16="http://schemas.microsoft.com/office/drawing/2014/main" id="{AD54CFCF-733F-420E-8CD2-F5DAB76B2DB4}"/>
+                    </a:ext>
+                  </a:extLst>
+                </p:cNvPr>
+                <p:cNvSpPr/>
+                <p:nvPr/>
+              </p:nvSpPr>
+              <p:spPr>
+                <a:xfrm>
+                  <a:off x="785119" y="1200193"/>
+                  <a:ext cx="3031093" cy="3110819"/>
+                </a:xfrm>
+                <a:prstGeom prst="roundRect">
+                  <a:avLst>
+                    <a:gd name="adj" fmla="val 16667"/>
+                  </a:avLst>
+                </a:prstGeom>
+                <a:solidFill>
+                  <a:srgbClr val="CCCCCC"/>
+                </a:solidFill>
+                <a:ln w="28575" cap="flat" cmpd="sng">
+                  <a:solidFill>
+                    <a:schemeClr val="dk2"/>
+                  </a:solidFill>
+                  <a:prstDash val="solid"/>
+                  <a:round/>
+                  <a:headEnd type="none" w="sm" len="sm"/>
+                  <a:tailEnd type="none" w="sm" len="sm"/>
+                </a:ln>
+              </p:spPr>
+              <p:txBody>
+                <a:bodyPr spcFirstLastPara="1" wrap="square" lIns="121900" tIns="121900" rIns="121900" bIns="121900" anchor="ctr" anchorCtr="0">
+                  <a:noAutofit/>
+                </a:bodyPr>
+                <a:lstStyle/>
+                <a:p>
+                  <a:endParaRPr sz="2400"/>
+                </a:p>
+              </p:txBody>
+            </p:sp>
+            <p:pic>
+              <p:nvPicPr>
+                <p:cNvPr id="82" name="Google Shape;307;p25">
+                  <a:extLst>
+                    <a:ext uri="{FF2B5EF4-FFF2-40B4-BE49-F238E27FC236}">
+                      <a16:creationId xmlns:a16="http://schemas.microsoft.com/office/drawing/2014/main" id="{6B0A4C8A-BEC0-46C8-97DB-4CA0D808F07F}"/>
+                    </a:ext>
+                  </a:extLst>
+                </p:cNvPr>
+                <p:cNvPicPr preferRelativeResize="0"/>
+                <p:nvPr/>
+              </p:nvPicPr>
+              <p:blipFill>
+                <a:blip r:embed="rId3">
+                  <a:alphaModFix/>
+                </a:blip>
+                <a:stretch>
+                  <a:fillRect/>
+                </a:stretch>
+              </p:blipFill>
+              <p:spPr>
+                <a:xfrm>
+                  <a:off x="1533670" y="1587494"/>
+                  <a:ext cx="1051099" cy="697199"/>
+                </a:xfrm>
+                <a:prstGeom prst="rect">
+                  <a:avLst/>
+                </a:prstGeom>
+                <a:noFill/>
+                <a:ln w="9525" cap="flat" cmpd="sng">
+                  <a:solidFill>
+                    <a:schemeClr val="dk2"/>
+                  </a:solidFill>
+                  <a:prstDash val="solid"/>
+                  <a:round/>
+                  <a:headEnd type="none" w="sm" len="sm"/>
+                  <a:tailEnd type="none" w="sm" len="sm"/>
+                </a:ln>
+              </p:spPr>
+            </p:pic>
+            <p:pic>
+              <p:nvPicPr>
+                <p:cNvPr id="83" name="Google Shape;308;p25">
+                  <a:extLst>
+                    <a:ext uri="{FF2B5EF4-FFF2-40B4-BE49-F238E27FC236}">
+                      <a16:creationId xmlns:a16="http://schemas.microsoft.com/office/drawing/2014/main" id="{478055EB-9413-4DBB-AC9D-ABF0119BA5F0}"/>
+                    </a:ext>
+                  </a:extLst>
+                </p:cNvPr>
+                <p:cNvPicPr preferRelativeResize="0"/>
+                <p:nvPr/>
+              </p:nvPicPr>
+              <p:blipFill>
+                <a:blip r:embed="rId3">
+                  <a:alphaModFix/>
+                </a:blip>
+                <a:stretch>
+                  <a:fillRect/>
+                </a:stretch>
+              </p:blipFill>
+              <p:spPr>
+                <a:xfrm>
+                  <a:off x="1808643" y="1807720"/>
+                  <a:ext cx="1102000" cy="730949"/>
+                </a:xfrm>
+                <a:prstGeom prst="rect">
+                  <a:avLst/>
+                </a:prstGeom>
+                <a:noFill/>
+                <a:ln w="9525" cap="flat" cmpd="sng">
+                  <a:solidFill>
+                    <a:schemeClr val="dk2"/>
+                  </a:solidFill>
+                  <a:prstDash val="solid"/>
+                  <a:round/>
+                  <a:headEnd type="none" w="sm" len="sm"/>
+                  <a:tailEnd type="none" w="sm" len="sm"/>
+                </a:ln>
+              </p:spPr>
+            </p:pic>
+            <p:pic>
+              <p:nvPicPr>
+                <p:cNvPr id="84" name="Google Shape;309;p25">
+                  <a:extLst>
+                    <a:ext uri="{FF2B5EF4-FFF2-40B4-BE49-F238E27FC236}">
+                      <a16:creationId xmlns:a16="http://schemas.microsoft.com/office/drawing/2014/main" id="{04C0DE0E-4B94-41C0-BF42-54DF7AFB4611}"/>
+                    </a:ext>
+                  </a:extLst>
+                </p:cNvPr>
+                <p:cNvPicPr preferRelativeResize="0"/>
+                <p:nvPr/>
+              </p:nvPicPr>
+              <p:blipFill>
+                <a:blip r:embed="rId3">
+                  <a:alphaModFix/>
+                </a:blip>
+                <a:stretch>
+                  <a:fillRect/>
+                </a:stretch>
+              </p:blipFill>
+              <p:spPr>
+                <a:xfrm>
+                  <a:off x="2076794" y="2032862"/>
+                  <a:ext cx="1102000" cy="730957"/>
+                </a:xfrm>
+                <a:prstGeom prst="rect">
+                  <a:avLst/>
+                </a:prstGeom>
+                <a:noFill/>
+                <a:ln w="9525" cap="flat" cmpd="sng">
+                  <a:solidFill>
+                    <a:schemeClr val="dk2"/>
+                  </a:solidFill>
+                  <a:prstDash val="solid"/>
+                  <a:round/>
+                  <a:headEnd type="none" w="sm" len="sm"/>
+                  <a:tailEnd type="none" w="sm" len="sm"/>
+                </a:ln>
+              </p:spPr>
+            </p:pic>
+            <p:sp>
+              <p:nvSpPr>
+                <p:cNvPr id="85" name="Google Shape;310;p25">
+                  <a:extLst>
+                    <a:ext uri="{FF2B5EF4-FFF2-40B4-BE49-F238E27FC236}">
+                      <a16:creationId xmlns:a16="http://schemas.microsoft.com/office/drawing/2014/main" id="{4D8F9150-DF36-4EC1-8FF5-066B89FFE771}"/>
+                    </a:ext>
+                  </a:extLst>
+                </p:cNvPr>
+                <p:cNvSpPr txBox="1"/>
+                <p:nvPr/>
+              </p:nvSpPr>
+              <p:spPr>
+                <a:xfrm>
+                  <a:off x="1159164" y="3351206"/>
+                  <a:ext cx="2170500" cy="1158191"/>
+                </a:xfrm>
+                <a:prstGeom prst="rect">
+                  <a:avLst/>
+                </a:prstGeom>
+                <a:noFill/>
+                <a:ln>
+                  <a:noFill/>
+                </a:ln>
+              </p:spPr>
+              <p:txBody>
+                <a:bodyPr spcFirstLastPara="1" wrap="square" lIns="121900" tIns="121900" rIns="121900" bIns="121900" anchor="t" anchorCtr="0">
+                  <a:spAutoFit/>
+                </a:bodyPr>
+                <a:lstStyle/>
+                <a:p>
+                  <a:pPr algn="ctr"/>
+                  <a:r>
+                    <a:rPr lang="nl" sz="1200" b="1">
+                      <a:solidFill>
+                        <a:srgbClr val="666666"/>
+                      </a:solidFill>
+                    </a:rPr>
+                    <a:t>Hub #2</a:t>
+                  </a:r>
+                  <a:endParaRPr sz="1200" b="1" err="1">
+                    <a:solidFill>
+                      <a:srgbClr val="666666"/>
+                    </a:solidFill>
+                  </a:endParaRPr>
+                </a:p>
+              </p:txBody>
+            </p:sp>
+          </p:grpSp>
+          <p:sp>
+            <p:nvSpPr>
+              <p:cNvPr id="80" name="Google Shape;304;p25">
+                <a:extLst>
+                  <a:ext uri="{FF2B5EF4-FFF2-40B4-BE49-F238E27FC236}">
+                    <a16:creationId xmlns:a16="http://schemas.microsoft.com/office/drawing/2014/main" id="{B896A2E3-60C1-4108-BC31-10580448F5D2}"/>
+                  </a:ext>
+                </a:extLst>
+              </p:cNvPr>
+              <p:cNvSpPr/>
+              <p:nvPr/>
+            </p:nvSpPr>
+            <p:spPr>
+              <a:xfrm>
+                <a:off x="3233173" y="5584163"/>
+                <a:ext cx="1163360" cy="217107"/>
+              </a:xfrm>
+              <a:prstGeom prst="roundRect">
+                <a:avLst>
+                  <a:gd name="adj" fmla="val 16667"/>
+                </a:avLst>
+              </a:prstGeom>
+              <a:solidFill>
+                <a:srgbClr val="00BCD4">
+                  <a:alpha val="28430"/>
+                </a:srgbClr>
+              </a:solidFill>
+              <a:ln w="9525" cap="flat" cmpd="sng">
+                <a:solidFill>
+                  <a:schemeClr val="dk2"/>
+                </a:solidFill>
+                <a:prstDash val="solid"/>
+                <a:round/>
+                <a:headEnd type="none" w="sm" len="sm"/>
+                <a:tailEnd type="none" w="sm" len="sm"/>
+              </a:ln>
+            </p:spPr>
+            <p:txBody>
+              <a:bodyPr spcFirstLastPara="1" wrap="square" lIns="121900" tIns="121900" rIns="121900" bIns="121900" anchor="ctr" anchorCtr="0">
+                <a:noAutofit/>
+              </a:bodyPr>
+              <a:lstStyle/>
+              <a:p>
+                <a:pPr algn="ctr"/>
+                <a:r>
+                  <a:rPr lang="nl" sz="1200">
+                    <a:latin typeface="Alegreya"/>
+                  </a:rPr>
+                  <a:t>Community</a:t>
+                </a:r>
+                <a:endParaRPr lang="en-US" sz="1200">
+                  <a:latin typeface="Alegreya"/>
+                </a:endParaRPr>
+              </a:p>
+            </p:txBody>
+          </p:sp>
+        </p:grpSp>
+      </p:grpSp>
+      <p:pic>
+        <p:nvPicPr>
+          <p:cNvPr id="4" name="Afbeelding 3">
+            <a:extLst>
+              <a:ext uri="{FF2B5EF4-FFF2-40B4-BE49-F238E27FC236}">
+                <a16:creationId xmlns:a16="http://schemas.microsoft.com/office/drawing/2014/main" id="{46D15610-2503-4E03-BABE-82A265DEB3E6}"/>
+              </a:ext>
+            </a:extLst>
+          </p:cNvPr>
+          <p:cNvPicPr>
+            <a:picLocks noChangeAspect="1"/>
+          </p:cNvPicPr>
+          <p:nvPr/>
+        </p:nvPicPr>
+        <p:blipFill>
+          <a:blip r:embed="rId4"/>
+          <a:stretch>
+            <a:fillRect/>
+          </a:stretch>
+        </p:blipFill>
+        <p:spPr>
+          <a:xfrm>
+            <a:off x="4617387" y="3331675"/>
+            <a:ext cx="625245" cy="353599"/>
+          </a:xfrm>
+          <a:prstGeom prst="rect">
+            <a:avLst/>
+          </a:prstGeom>
+        </p:spPr>
+      </p:pic>
     </p:spTree>
   </p:cSld>
   <p:clrMapOvr>
@@ -15756,18 +15974,18 @@
 </file>
 
 <file path=customXml/item2.xml><?xml version="1.0" encoding="utf-8"?>
+<p:properties xmlns:p="http://schemas.microsoft.com/office/2006/metadata/properties" xmlns:xsi="http://www.w3.org/2001/XMLSchema-instance" xmlns:pc="http://schemas.microsoft.com/office/infopath/2007/PartnerControls">
+  <documentManagement/>
+</p:properties>
+</file>
+
+<file path=customXml/item3.xml><?xml version="1.0" encoding="utf-8"?>
 <?mso-contentType ?>
 <FormTemplates xmlns="http://schemas.microsoft.com/sharepoint/v3/contenttype/forms">
   <Display>DocumentLibraryForm</Display>
   <Edit>DocumentLibraryForm</Edit>
   <New>DocumentLibraryForm</New>
 </FormTemplates>
-</file>
-
-<file path=customXml/item3.xml><?xml version="1.0" encoding="utf-8"?>
-<p:properties xmlns:p="http://schemas.microsoft.com/office/2006/metadata/properties" xmlns:xsi="http://www.w3.org/2001/XMLSchema-instance" xmlns:pc="http://schemas.microsoft.com/office/infopath/2007/PartnerControls">
-  <documentManagement/>
-</p:properties>
 </file>
 
 <file path=customXml/itemProps1.xml><?xml version="1.0" encoding="utf-8"?>
@@ -15790,18 +16008,18 @@
 </file>
 
 <file path=customXml/itemProps2.xml><?xml version="1.0" encoding="utf-8"?>
-<ds:datastoreItem xmlns:ds="http://schemas.openxmlformats.org/officeDocument/2006/customXml" ds:itemID="{DF3B2801-6BA5-4BCB-9F38-96998791D77C}">
-  <ds:schemaRefs>
-    <ds:schemaRef ds:uri="http://schemas.microsoft.com/sharepoint/v3/contenttype/forms"/>
-  </ds:schemaRefs>
-</ds:datastoreItem>
-</file>
-
-<file path=customXml/itemProps3.xml><?xml version="1.0" encoding="utf-8"?>
 <ds:datastoreItem xmlns:ds="http://schemas.openxmlformats.org/officeDocument/2006/customXml" ds:itemID="{E573E523-E40D-4BF0-AA5C-AEC391FCD5B4}">
   <ds:schemaRefs>
     <ds:schemaRef ds:uri="http://schemas.microsoft.com/office/2006/metadata/properties"/>
     <ds:schemaRef ds:uri="http://schemas.microsoft.com/office/infopath/2007/PartnerControls"/>
   </ds:schemaRefs>
 </ds:datastoreItem>
+</file>
+
+<file path=customXml/itemProps3.xml><?xml version="1.0" encoding="utf-8"?>
+<ds:datastoreItem xmlns:ds="http://schemas.openxmlformats.org/officeDocument/2006/customXml" ds:itemID="{DF3B2801-6BA5-4BCB-9F38-96998791D77C}">
+  <ds:schemaRefs>
+    <ds:schemaRef ds:uri="http://schemas.microsoft.com/sharepoint/v3/contenttype/forms"/>
+  </ds:schemaRefs>
+</ds:datastoreItem>
 </file>
</xml_diff>